<commit_message>
Fertigstellung erster Version der Präsentation zu Milestone 1
</commit_message>
<xml_diff>
--- a/Non-Code (Doku usw.)/Semester 2/_Präsentationen/Präsentation Milestone 1 04.04.17.pptx
+++ b/Non-Code (Doku usw.)/Semester 2/_Präsentationen/Präsentation Milestone 1 04.04.17.pptx
@@ -9,10 +9,10 @@
     <p:sldMasterId id="2147483683" r:id="rId5"/>
   </p:sldMasterIdLst>
   <p:notesMasterIdLst>
-    <p:notesMasterId r:id="rId21"/>
+    <p:notesMasterId r:id="rId25"/>
   </p:notesMasterIdLst>
   <p:handoutMasterIdLst>
-    <p:handoutMasterId r:id="rId22"/>
+    <p:handoutMasterId r:id="rId26"/>
   </p:handoutMasterIdLst>
   <p:sldIdLst>
     <p:sldId id="293" r:id="rId6"/>
@@ -27,9 +27,13 @@
     <p:sldId id="314" r:id="rId15"/>
     <p:sldId id="318" r:id="rId16"/>
     <p:sldId id="315" r:id="rId17"/>
-    <p:sldId id="316" r:id="rId18"/>
-    <p:sldId id="317" r:id="rId19"/>
-    <p:sldId id="278" r:id="rId20"/>
+    <p:sldId id="319" r:id="rId18"/>
+    <p:sldId id="320" r:id="rId19"/>
+    <p:sldId id="321" r:id="rId20"/>
+    <p:sldId id="322" r:id="rId21"/>
+    <p:sldId id="323" r:id="rId22"/>
+    <p:sldId id="324" r:id="rId23"/>
+    <p:sldId id="278" r:id="rId24"/>
   </p:sldIdLst>
   <p:sldSz cx="12192000" cy="6858000"/>
   <p:notesSz cx="6858000" cy="9144000"/>
@@ -12872,7 +12876,7 @@
           <a:p>
             <a:fld id="{B3BF51E1-E418-4EEC-836E-5CFF5E7A6C5B}" type="datetimeFigureOut">
               <a:rPr lang="de-DE" smtClean="0"/>
-              <a:t>31.03.2017</a:t>
+              <a:t>03.04.2017</a:t>
             </a:fld>
             <a:endParaRPr lang="de-DE"/>
           </a:p>
@@ -13037,7 +13041,7 @@
           <a:p>
             <a:fld id="{AAE480F6-1629-4183-9B8E-99B98793D212}" type="datetimeFigureOut">
               <a:rPr lang="de-DE" smtClean="0"/>
-              <a:t>31.03.2017</a:t>
+              <a:t>03.04.2017</a:t>
             </a:fld>
             <a:endParaRPr lang="de-DE"/>
           </a:p>
@@ -13388,6 +13392,197 @@
 </p:notes>
 </file>
 
+<file path=ppt/notesSlides/notesSlide10.xml><?xml version="1.0" encoding="utf-8"?>
+<p:notes xmlns:a="http://schemas.openxmlformats.org/drawingml/2006/main" xmlns:r="http://schemas.openxmlformats.org/officeDocument/2006/relationships" xmlns:p="http://schemas.openxmlformats.org/presentationml/2006/main">
+  <p:cSld>
+    <p:spTree>
+      <p:nvGrpSpPr>
+        <p:cNvPr id="1" name=""/>
+        <p:cNvGrpSpPr/>
+        <p:nvPr/>
+      </p:nvGrpSpPr>
+      <p:grpSpPr>
+        <a:xfrm>
+          <a:off x="0" y="0"/>
+          <a:ext cx="0" cy="0"/>
+          <a:chOff x="0" y="0"/>
+          <a:chExt cx="0" cy="0"/>
+        </a:xfrm>
+      </p:grpSpPr>
+      <p:sp>
+        <p:nvSpPr>
+          <p:cNvPr id="2" name="Folienbildplatzhalter 1"/>
+          <p:cNvSpPr>
+            <a:spLocks noGrp="1" noRot="1" noChangeAspect="1"/>
+          </p:cNvSpPr>
+          <p:nvPr>
+            <p:ph type="sldImg"/>
+          </p:nvPr>
+        </p:nvSpPr>
+        <p:spPr/>
+      </p:sp>
+      <p:sp>
+        <p:nvSpPr>
+          <p:cNvPr id="3" name="Notizenplatzhalter 2"/>
+          <p:cNvSpPr>
+            <a:spLocks noGrp="1"/>
+          </p:cNvSpPr>
+          <p:nvPr>
+            <p:ph type="body" idx="1"/>
+          </p:nvPr>
+        </p:nvSpPr>
+        <p:spPr/>
+        <p:txBody>
+          <a:bodyPr/>
+          <a:lstStyle/>
+          <a:p>
+            <a:endParaRPr lang="de-DE" dirty="0"/>
+          </a:p>
+        </p:txBody>
+      </p:sp>
+      <p:sp>
+        <p:nvSpPr>
+          <p:cNvPr id="4" name="Foliennummernplatzhalter 3"/>
+          <p:cNvSpPr>
+            <a:spLocks noGrp="1"/>
+          </p:cNvSpPr>
+          <p:nvPr>
+            <p:ph type="sldNum" sz="quarter" idx="10"/>
+          </p:nvPr>
+        </p:nvSpPr>
+        <p:spPr/>
+        <p:txBody>
+          <a:bodyPr/>
+          <a:lstStyle/>
+          <a:p>
+            <a:fld id="{2C6D43BA-BF3B-4C35-86C4-88F3F3542AEC}" type="slidenum">
+              <a:rPr lang="de-DE" smtClean="0"/>
+              <a:t>18</a:t>
+            </a:fld>
+            <a:endParaRPr lang="de-DE"/>
+          </a:p>
+        </p:txBody>
+      </p:sp>
+    </p:spTree>
+    <p:extLst>
+      <p:ext uri="{BB962C8B-B14F-4D97-AF65-F5344CB8AC3E}">
+        <p14:creationId xmlns:p14="http://schemas.microsoft.com/office/powerpoint/2010/main" val="103280916"/>
+      </p:ext>
+    </p:extLst>
+  </p:cSld>
+  <p:clrMapOvr>
+    <a:masterClrMapping/>
+  </p:clrMapOvr>
+</p:notes>
+</file>
+
+<file path=ppt/notesSlides/notesSlide11.xml><?xml version="1.0" encoding="utf-8"?>
+<p:notes xmlns:a="http://schemas.openxmlformats.org/drawingml/2006/main" xmlns:r="http://schemas.openxmlformats.org/officeDocument/2006/relationships" xmlns:p="http://schemas.openxmlformats.org/presentationml/2006/main">
+  <p:cSld>
+    <p:spTree>
+      <p:nvGrpSpPr>
+        <p:cNvPr id="1" name=""/>
+        <p:cNvGrpSpPr/>
+        <p:nvPr/>
+      </p:nvGrpSpPr>
+      <p:grpSpPr>
+        <a:xfrm>
+          <a:off x="0" y="0"/>
+          <a:ext cx="0" cy="0"/>
+          <a:chOff x="0" y="0"/>
+          <a:chExt cx="0" cy="0"/>
+        </a:xfrm>
+      </p:grpSpPr>
+      <p:sp>
+        <p:nvSpPr>
+          <p:cNvPr id="2" name="Folienbildplatzhalter 1"/>
+          <p:cNvSpPr>
+            <a:spLocks noGrp="1" noRot="1" noChangeAspect="1"/>
+          </p:cNvSpPr>
+          <p:nvPr>
+            <p:ph type="sldImg"/>
+          </p:nvPr>
+        </p:nvSpPr>
+        <p:spPr/>
+      </p:sp>
+      <p:sp>
+        <p:nvSpPr>
+          <p:cNvPr id="3" name="Notizenplatzhalter 2"/>
+          <p:cNvSpPr>
+            <a:spLocks noGrp="1"/>
+          </p:cNvSpPr>
+          <p:nvPr>
+            <p:ph type="body" idx="1"/>
+          </p:nvPr>
+        </p:nvSpPr>
+        <p:spPr/>
+        <p:txBody>
+          <a:bodyPr/>
+          <a:lstStyle/>
+          <a:p>
+            <a:pPr marL="0" marR="0" lvl="0" indent="0" algn="l" defTabSz="914400" rtl="0" eaLnBrk="1" fontAlgn="auto" latinLnBrk="0" hangingPunct="1">
+              <a:lnSpc>
+                <a:spcPct val="100000"/>
+              </a:lnSpc>
+              <a:spcBef>
+                <a:spcPts val="0"/>
+              </a:spcBef>
+              <a:spcAft>
+                <a:spcPts val="0"/>
+              </a:spcAft>
+              <a:buClrTx/>
+              <a:buSzTx/>
+              <a:buFontTx/>
+              <a:buNone/>
+              <a:tabLst/>
+              <a:defRPr/>
+            </a:pPr>
+            <a:r>
+              <a:rPr lang="de-DE" dirty="0"/>
+              <a:t>Anmerkung: Hier vielleicht nochmal Grafiken der gewählten Lösungen einfügen, damit Grafik reinkommt?</a:t>
+            </a:r>
+          </a:p>
+          <a:p>
+            <a:endParaRPr lang="en-US" dirty="0"/>
+          </a:p>
+        </p:txBody>
+      </p:sp>
+      <p:sp>
+        <p:nvSpPr>
+          <p:cNvPr id="4" name="Foliennummernplatzhalter 3"/>
+          <p:cNvSpPr>
+            <a:spLocks noGrp="1"/>
+          </p:cNvSpPr>
+          <p:nvPr>
+            <p:ph type="sldNum" sz="quarter" idx="10"/>
+          </p:nvPr>
+        </p:nvSpPr>
+        <p:spPr/>
+        <p:txBody>
+          <a:bodyPr/>
+          <a:lstStyle/>
+          <a:p>
+            <a:fld id="{2C6D43BA-BF3B-4C35-86C4-88F3F3542AEC}" type="slidenum">
+              <a:rPr lang="de-DE" smtClean="0"/>
+              <a:t>19</a:t>
+            </a:fld>
+            <a:endParaRPr lang="de-DE"/>
+          </a:p>
+        </p:txBody>
+      </p:sp>
+    </p:spTree>
+    <p:extLst>
+      <p:ext uri="{BB962C8B-B14F-4D97-AF65-F5344CB8AC3E}">
+        <p14:creationId xmlns:p14="http://schemas.microsoft.com/office/powerpoint/2010/main" val="1817359460"/>
+      </p:ext>
+    </p:extLst>
+  </p:cSld>
+  <p:clrMapOvr>
+    <a:masterClrMapping/>
+  </p:clrMapOvr>
+</p:notes>
+</file>
+
 <file path=ppt/notesSlides/notesSlide2.xml><?xml version="1.0" encoding="utf-8"?>
 <p:notes xmlns:a="http://schemas.openxmlformats.org/drawingml/2006/main" xmlns:r="http://schemas.openxmlformats.org/officeDocument/2006/relationships" xmlns:p="http://schemas.openxmlformats.org/presentationml/2006/main">
   <p:cSld>
@@ -13627,30 +13822,259 @@
           <a:bodyPr/>
           <a:lstStyle/>
           <a:p>
-            <a:pPr marL="0" marR="0" lvl="0" indent="0" algn="l" defTabSz="914400" rtl="0" eaLnBrk="1" fontAlgn="auto" latinLnBrk="0" hangingPunct="1">
-              <a:lnSpc>
-                <a:spcPct val="100000"/>
-              </a:lnSpc>
-              <a:spcBef>
-                <a:spcPts val="0"/>
-              </a:spcBef>
-              <a:spcAft>
-                <a:spcPts val="0"/>
-              </a:spcAft>
-              <a:buClrTx/>
-              <a:buSzTx/>
-              <a:buFontTx/>
-              <a:buNone/>
-              <a:tabLst/>
-              <a:defRPr/>
-            </a:pPr>
-            <a:r>
-              <a:rPr lang="de-DE" dirty="0"/>
-              <a:t>Anmerkung: Hier vielleicht nochmal Grafiken der gewählten Lösungen einfügen, damit Grafik reinkommt?</a:t>
-            </a:r>
-          </a:p>
-          <a:p>
-            <a:endParaRPr lang="en-US" dirty="0"/>
+            <a:endParaRPr lang="de-DE" dirty="0"/>
+          </a:p>
+        </p:txBody>
+      </p:sp>
+      <p:sp>
+        <p:nvSpPr>
+          <p:cNvPr id="4" name="Foliennummernplatzhalter 3"/>
+          <p:cNvSpPr>
+            <a:spLocks noGrp="1"/>
+          </p:cNvSpPr>
+          <p:nvPr>
+            <p:ph type="sldNum" sz="quarter" idx="10"/>
+          </p:nvPr>
+        </p:nvSpPr>
+        <p:spPr/>
+        <p:txBody>
+          <a:bodyPr/>
+          <a:lstStyle/>
+          <a:p>
+            <a:fld id="{2C6D43BA-BF3B-4C35-86C4-88F3F3542AEC}" type="slidenum">
+              <a:rPr lang="de-DE" smtClean="0"/>
+              <a:t>12</a:t>
+            </a:fld>
+            <a:endParaRPr lang="de-DE"/>
+          </a:p>
+        </p:txBody>
+      </p:sp>
+    </p:spTree>
+    <p:extLst>
+      <p:ext uri="{BB962C8B-B14F-4D97-AF65-F5344CB8AC3E}">
+        <p14:creationId xmlns:p14="http://schemas.microsoft.com/office/powerpoint/2010/main" val="2511481381"/>
+      </p:ext>
+    </p:extLst>
+  </p:cSld>
+  <p:clrMapOvr>
+    <a:masterClrMapping/>
+  </p:clrMapOvr>
+</p:notes>
+</file>
+
+<file path=ppt/notesSlides/notesSlide5.xml><?xml version="1.0" encoding="utf-8"?>
+<p:notes xmlns:a="http://schemas.openxmlformats.org/drawingml/2006/main" xmlns:r="http://schemas.openxmlformats.org/officeDocument/2006/relationships" xmlns:p="http://schemas.openxmlformats.org/presentationml/2006/main">
+  <p:cSld>
+    <p:spTree>
+      <p:nvGrpSpPr>
+        <p:cNvPr id="1" name=""/>
+        <p:cNvGrpSpPr/>
+        <p:nvPr/>
+      </p:nvGrpSpPr>
+      <p:grpSpPr>
+        <a:xfrm>
+          <a:off x="0" y="0"/>
+          <a:ext cx="0" cy="0"/>
+          <a:chOff x="0" y="0"/>
+          <a:chExt cx="0" cy="0"/>
+        </a:xfrm>
+      </p:grpSpPr>
+      <p:sp>
+        <p:nvSpPr>
+          <p:cNvPr id="2" name="Folienbildplatzhalter 1"/>
+          <p:cNvSpPr>
+            <a:spLocks noGrp="1" noRot="1" noChangeAspect="1"/>
+          </p:cNvSpPr>
+          <p:nvPr>
+            <p:ph type="sldImg"/>
+          </p:nvPr>
+        </p:nvSpPr>
+        <p:spPr/>
+      </p:sp>
+      <p:sp>
+        <p:nvSpPr>
+          <p:cNvPr id="3" name="Notizenplatzhalter 2"/>
+          <p:cNvSpPr>
+            <a:spLocks noGrp="1"/>
+          </p:cNvSpPr>
+          <p:nvPr>
+            <p:ph type="body" idx="1"/>
+          </p:nvPr>
+        </p:nvSpPr>
+        <p:spPr/>
+        <p:txBody>
+          <a:bodyPr/>
+          <a:lstStyle/>
+          <a:p>
+            <a:endParaRPr lang="de-DE" dirty="0"/>
+          </a:p>
+        </p:txBody>
+      </p:sp>
+      <p:sp>
+        <p:nvSpPr>
+          <p:cNvPr id="4" name="Foliennummernplatzhalter 3"/>
+          <p:cNvSpPr>
+            <a:spLocks noGrp="1"/>
+          </p:cNvSpPr>
+          <p:nvPr>
+            <p:ph type="sldNum" sz="quarter" idx="10"/>
+          </p:nvPr>
+        </p:nvSpPr>
+        <p:spPr/>
+        <p:txBody>
+          <a:bodyPr/>
+          <a:lstStyle/>
+          <a:p>
+            <a:fld id="{2C6D43BA-BF3B-4C35-86C4-88F3F3542AEC}" type="slidenum">
+              <a:rPr lang="de-DE" smtClean="0"/>
+              <a:t>13</a:t>
+            </a:fld>
+            <a:endParaRPr lang="de-DE"/>
+          </a:p>
+        </p:txBody>
+      </p:sp>
+    </p:spTree>
+    <p:extLst>
+      <p:ext uri="{BB962C8B-B14F-4D97-AF65-F5344CB8AC3E}">
+        <p14:creationId xmlns:p14="http://schemas.microsoft.com/office/powerpoint/2010/main" val="3102474487"/>
+      </p:ext>
+    </p:extLst>
+  </p:cSld>
+  <p:clrMapOvr>
+    <a:masterClrMapping/>
+  </p:clrMapOvr>
+</p:notes>
+</file>
+
+<file path=ppt/notesSlides/notesSlide6.xml><?xml version="1.0" encoding="utf-8"?>
+<p:notes xmlns:a="http://schemas.openxmlformats.org/drawingml/2006/main" xmlns:r="http://schemas.openxmlformats.org/officeDocument/2006/relationships" xmlns:p="http://schemas.openxmlformats.org/presentationml/2006/main">
+  <p:cSld>
+    <p:spTree>
+      <p:nvGrpSpPr>
+        <p:cNvPr id="1" name=""/>
+        <p:cNvGrpSpPr/>
+        <p:nvPr/>
+      </p:nvGrpSpPr>
+      <p:grpSpPr>
+        <a:xfrm>
+          <a:off x="0" y="0"/>
+          <a:ext cx="0" cy="0"/>
+          <a:chOff x="0" y="0"/>
+          <a:chExt cx="0" cy="0"/>
+        </a:xfrm>
+      </p:grpSpPr>
+      <p:sp>
+        <p:nvSpPr>
+          <p:cNvPr id="2" name="Folienbildplatzhalter 1"/>
+          <p:cNvSpPr>
+            <a:spLocks noGrp="1" noRot="1" noChangeAspect="1"/>
+          </p:cNvSpPr>
+          <p:nvPr>
+            <p:ph type="sldImg"/>
+          </p:nvPr>
+        </p:nvSpPr>
+        <p:spPr/>
+      </p:sp>
+      <p:sp>
+        <p:nvSpPr>
+          <p:cNvPr id="3" name="Notizenplatzhalter 2"/>
+          <p:cNvSpPr>
+            <a:spLocks noGrp="1"/>
+          </p:cNvSpPr>
+          <p:nvPr>
+            <p:ph type="body" idx="1"/>
+          </p:nvPr>
+        </p:nvSpPr>
+        <p:spPr/>
+        <p:txBody>
+          <a:bodyPr/>
+          <a:lstStyle/>
+          <a:p>
+            <a:endParaRPr lang="de-DE" dirty="0"/>
+          </a:p>
+        </p:txBody>
+      </p:sp>
+      <p:sp>
+        <p:nvSpPr>
+          <p:cNvPr id="4" name="Foliennummernplatzhalter 3"/>
+          <p:cNvSpPr>
+            <a:spLocks noGrp="1"/>
+          </p:cNvSpPr>
+          <p:nvPr>
+            <p:ph type="sldNum" sz="quarter" idx="10"/>
+          </p:nvPr>
+        </p:nvSpPr>
+        <p:spPr/>
+        <p:txBody>
+          <a:bodyPr/>
+          <a:lstStyle/>
+          <a:p>
+            <a:fld id="{2C6D43BA-BF3B-4C35-86C4-88F3F3542AEC}" type="slidenum">
+              <a:rPr lang="de-DE" smtClean="0"/>
+              <a:t>14</a:t>
+            </a:fld>
+            <a:endParaRPr lang="de-DE"/>
+          </a:p>
+        </p:txBody>
+      </p:sp>
+    </p:spTree>
+    <p:extLst>
+      <p:ext uri="{BB962C8B-B14F-4D97-AF65-F5344CB8AC3E}">
+        <p14:creationId xmlns:p14="http://schemas.microsoft.com/office/powerpoint/2010/main" val="4238585323"/>
+      </p:ext>
+    </p:extLst>
+  </p:cSld>
+  <p:clrMapOvr>
+    <a:masterClrMapping/>
+  </p:clrMapOvr>
+</p:notes>
+</file>
+
+<file path=ppt/notesSlides/notesSlide7.xml><?xml version="1.0" encoding="utf-8"?>
+<p:notes xmlns:a="http://schemas.openxmlformats.org/drawingml/2006/main" xmlns:r="http://schemas.openxmlformats.org/officeDocument/2006/relationships" xmlns:p="http://schemas.openxmlformats.org/presentationml/2006/main">
+  <p:cSld>
+    <p:spTree>
+      <p:nvGrpSpPr>
+        <p:cNvPr id="1" name=""/>
+        <p:cNvGrpSpPr/>
+        <p:nvPr/>
+      </p:nvGrpSpPr>
+      <p:grpSpPr>
+        <a:xfrm>
+          <a:off x="0" y="0"/>
+          <a:ext cx="0" cy="0"/>
+          <a:chOff x="0" y="0"/>
+          <a:chExt cx="0" cy="0"/>
+        </a:xfrm>
+      </p:grpSpPr>
+      <p:sp>
+        <p:nvSpPr>
+          <p:cNvPr id="2" name="Folienbildplatzhalter 1"/>
+          <p:cNvSpPr>
+            <a:spLocks noGrp="1" noRot="1" noChangeAspect="1"/>
+          </p:cNvSpPr>
+          <p:nvPr>
+            <p:ph type="sldImg"/>
+          </p:nvPr>
+        </p:nvSpPr>
+        <p:spPr/>
+      </p:sp>
+      <p:sp>
+        <p:nvSpPr>
+          <p:cNvPr id="3" name="Notizenplatzhalter 2"/>
+          <p:cNvSpPr>
+            <a:spLocks noGrp="1"/>
+          </p:cNvSpPr>
+          <p:nvPr>
+            <p:ph type="body" idx="1"/>
+          </p:nvPr>
+        </p:nvSpPr>
+        <p:spPr/>
+        <p:txBody>
+          <a:bodyPr/>
+          <a:lstStyle/>
+          <a:p>
+            <a:endParaRPr lang="de-DE" dirty="0"/>
           </a:p>
         </p:txBody>
       </p:sp>
@@ -13680,7 +14104,175 @@
     </p:spTree>
     <p:extLst>
       <p:ext uri="{BB962C8B-B14F-4D97-AF65-F5344CB8AC3E}">
-        <p14:creationId xmlns:p14="http://schemas.microsoft.com/office/powerpoint/2010/main" val="1817359460"/>
+        <p14:creationId xmlns:p14="http://schemas.microsoft.com/office/powerpoint/2010/main" val="3248560998"/>
+      </p:ext>
+    </p:extLst>
+  </p:cSld>
+  <p:clrMapOvr>
+    <a:masterClrMapping/>
+  </p:clrMapOvr>
+</p:notes>
+</file>
+
+<file path=ppt/notesSlides/notesSlide8.xml><?xml version="1.0" encoding="utf-8"?>
+<p:notes xmlns:a="http://schemas.openxmlformats.org/drawingml/2006/main" xmlns:r="http://schemas.openxmlformats.org/officeDocument/2006/relationships" xmlns:p="http://schemas.openxmlformats.org/presentationml/2006/main">
+  <p:cSld>
+    <p:spTree>
+      <p:nvGrpSpPr>
+        <p:cNvPr id="1" name=""/>
+        <p:cNvGrpSpPr/>
+        <p:nvPr/>
+      </p:nvGrpSpPr>
+      <p:grpSpPr>
+        <a:xfrm>
+          <a:off x="0" y="0"/>
+          <a:ext cx="0" cy="0"/>
+          <a:chOff x="0" y="0"/>
+          <a:chExt cx="0" cy="0"/>
+        </a:xfrm>
+      </p:grpSpPr>
+      <p:sp>
+        <p:nvSpPr>
+          <p:cNvPr id="2" name="Folienbildplatzhalter 1"/>
+          <p:cNvSpPr>
+            <a:spLocks noGrp="1" noRot="1" noChangeAspect="1"/>
+          </p:cNvSpPr>
+          <p:nvPr>
+            <p:ph type="sldImg"/>
+          </p:nvPr>
+        </p:nvSpPr>
+        <p:spPr/>
+      </p:sp>
+      <p:sp>
+        <p:nvSpPr>
+          <p:cNvPr id="3" name="Notizenplatzhalter 2"/>
+          <p:cNvSpPr>
+            <a:spLocks noGrp="1"/>
+          </p:cNvSpPr>
+          <p:nvPr>
+            <p:ph type="body" idx="1"/>
+          </p:nvPr>
+        </p:nvSpPr>
+        <p:spPr/>
+        <p:txBody>
+          <a:bodyPr/>
+          <a:lstStyle/>
+          <a:p>
+            <a:endParaRPr lang="de-DE" dirty="0"/>
+          </a:p>
+        </p:txBody>
+      </p:sp>
+      <p:sp>
+        <p:nvSpPr>
+          <p:cNvPr id="4" name="Foliennummernplatzhalter 3"/>
+          <p:cNvSpPr>
+            <a:spLocks noGrp="1"/>
+          </p:cNvSpPr>
+          <p:nvPr>
+            <p:ph type="sldNum" sz="quarter" idx="10"/>
+          </p:nvPr>
+        </p:nvSpPr>
+        <p:spPr/>
+        <p:txBody>
+          <a:bodyPr/>
+          <a:lstStyle/>
+          <a:p>
+            <a:fld id="{2C6D43BA-BF3B-4C35-86C4-88F3F3542AEC}" type="slidenum">
+              <a:rPr lang="de-DE" smtClean="0"/>
+              <a:t>16</a:t>
+            </a:fld>
+            <a:endParaRPr lang="de-DE"/>
+          </a:p>
+        </p:txBody>
+      </p:sp>
+    </p:spTree>
+    <p:extLst>
+      <p:ext uri="{BB962C8B-B14F-4D97-AF65-F5344CB8AC3E}">
+        <p14:creationId xmlns:p14="http://schemas.microsoft.com/office/powerpoint/2010/main" val="3698835772"/>
+      </p:ext>
+    </p:extLst>
+  </p:cSld>
+  <p:clrMapOvr>
+    <a:masterClrMapping/>
+  </p:clrMapOvr>
+</p:notes>
+</file>
+
+<file path=ppt/notesSlides/notesSlide9.xml><?xml version="1.0" encoding="utf-8"?>
+<p:notes xmlns:a="http://schemas.openxmlformats.org/drawingml/2006/main" xmlns:r="http://schemas.openxmlformats.org/officeDocument/2006/relationships" xmlns:p="http://schemas.openxmlformats.org/presentationml/2006/main">
+  <p:cSld>
+    <p:spTree>
+      <p:nvGrpSpPr>
+        <p:cNvPr id="1" name=""/>
+        <p:cNvGrpSpPr/>
+        <p:nvPr/>
+      </p:nvGrpSpPr>
+      <p:grpSpPr>
+        <a:xfrm>
+          <a:off x="0" y="0"/>
+          <a:ext cx="0" cy="0"/>
+          <a:chOff x="0" y="0"/>
+          <a:chExt cx="0" cy="0"/>
+        </a:xfrm>
+      </p:grpSpPr>
+      <p:sp>
+        <p:nvSpPr>
+          <p:cNvPr id="2" name="Folienbildplatzhalter 1"/>
+          <p:cNvSpPr>
+            <a:spLocks noGrp="1" noRot="1" noChangeAspect="1"/>
+          </p:cNvSpPr>
+          <p:nvPr>
+            <p:ph type="sldImg"/>
+          </p:nvPr>
+        </p:nvSpPr>
+        <p:spPr/>
+      </p:sp>
+      <p:sp>
+        <p:nvSpPr>
+          <p:cNvPr id="3" name="Notizenplatzhalter 2"/>
+          <p:cNvSpPr>
+            <a:spLocks noGrp="1"/>
+          </p:cNvSpPr>
+          <p:nvPr>
+            <p:ph type="body" idx="1"/>
+          </p:nvPr>
+        </p:nvSpPr>
+        <p:spPr/>
+        <p:txBody>
+          <a:bodyPr/>
+          <a:lstStyle/>
+          <a:p>
+            <a:endParaRPr lang="de-DE" dirty="0"/>
+          </a:p>
+        </p:txBody>
+      </p:sp>
+      <p:sp>
+        <p:nvSpPr>
+          <p:cNvPr id="4" name="Foliennummernplatzhalter 3"/>
+          <p:cNvSpPr>
+            <a:spLocks noGrp="1"/>
+          </p:cNvSpPr>
+          <p:nvPr>
+            <p:ph type="sldNum" sz="quarter" idx="10"/>
+          </p:nvPr>
+        </p:nvSpPr>
+        <p:spPr/>
+        <p:txBody>
+          <a:bodyPr/>
+          <a:lstStyle/>
+          <a:p>
+            <a:fld id="{2C6D43BA-BF3B-4C35-86C4-88F3F3542AEC}" type="slidenum">
+              <a:rPr lang="de-DE" smtClean="0"/>
+              <a:t>17</a:t>
+            </a:fld>
+            <a:endParaRPr lang="de-DE"/>
+          </a:p>
+        </p:txBody>
+      </p:sp>
+    </p:spTree>
+    <p:extLst>
+      <p:ext uri="{BB962C8B-B14F-4D97-AF65-F5344CB8AC3E}">
+        <p14:creationId xmlns:p14="http://schemas.microsoft.com/office/powerpoint/2010/main" val="1529328652"/>
       </p:ext>
     </p:extLst>
   </p:cSld>
@@ -32422,25 +33014,35 @@
           </a:p>
         </p:txBody>
       </p:sp>
-      <p:sp>
-        <p:nvSpPr>
-          <p:cNvPr id="12" name="Inhaltsplatzhalter 11"/>
-          <p:cNvSpPr>
-            <a:spLocks noGrp="1"/>
-          </p:cNvSpPr>
+      <p:pic>
+        <p:nvPicPr>
+          <p:cNvPr id="7" name="Inhaltsplatzhalter 6"/>
+          <p:cNvPicPr>
+            <a:picLocks noGrp="1" noChangeAspect="1"/>
+          </p:cNvPicPr>
           <p:nvPr>
             <p:ph idx="1"/>
           </p:nvPr>
-        </p:nvSpPr>
-        <p:spPr/>
-        <p:txBody>
-          <a:bodyPr/>
-          <a:lstStyle/>
-          <a:p>
-            <a:endParaRPr lang="de-DE"/>
-          </a:p>
-        </p:txBody>
-      </p:sp>
+        </p:nvPicPr>
+        <p:blipFill>
+          <a:blip r:embed="rId2">
+            <a:extLst>
+              <a:ext uri="{28A0092B-C50C-407E-A947-70E740481C1C}">
+                <a14:useLocalDpi xmlns:a14="http://schemas.microsoft.com/office/drawing/2010/main" val="0"/>
+              </a:ext>
+            </a:extLst>
+          </a:blip>
+          <a:stretch>
+            <a:fillRect/>
+          </a:stretch>
+        </p:blipFill>
+        <p:spPr>
+          <a:xfrm>
+            <a:off x="2591944" y="1825625"/>
+            <a:ext cx="7008112" cy="4351338"/>
+          </a:xfrm>
+        </p:spPr>
+      </p:pic>
     </p:spTree>
     <p:extLst>
       <p:ext uri="{BB962C8B-B14F-4D97-AF65-F5344CB8AC3E}">
@@ -32565,25 +33167,35 @@
           </a:p>
         </p:txBody>
       </p:sp>
-      <p:sp>
-        <p:nvSpPr>
-          <p:cNvPr id="12" name="Inhaltsplatzhalter 11"/>
-          <p:cNvSpPr>
-            <a:spLocks noGrp="1"/>
-          </p:cNvSpPr>
+      <p:pic>
+        <p:nvPicPr>
+          <p:cNvPr id="7" name="Inhaltsplatzhalter 6"/>
+          <p:cNvPicPr>
+            <a:picLocks noGrp="1" noChangeAspect="1"/>
+          </p:cNvPicPr>
           <p:nvPr>
             <p:ph idx="1"/>
           </p:nvPr>
-        </p:nvSpPr>
-        <p:spPr/>
-        <p:txBody>
-          <a:bodyPr/>
-          <a:lstStyle/>
-          <a:p>
-            <a:endParaRPr lang="de-DE"/>
-          </a:p>
-        </p:txBody>
-      </p:sp>
+        </p:nvPicPr>
+        <p:blipFill>
+          <a:blip r:embed="rId2">
+            <a:extLst>
+              <a:ext uri="{28A0092B-C50C-407E-A947-70E740481C1C}">
+                <a14:useLocalDpi xmlns:a14="http://schemas.microsoft.com/office/drawing/2010/main" val="0"/>
+              </a:ext>
+            </a:extLst>
+          </a:blip>
+          <a:stretch>
+            <a:fillRect/>
+          </a:stretch>
+        </p:blipFill>
+        <p:spPr>
+          <a:xfrm>
+            <a:off x="2591400" y="1825625"/>
+            <a:ext cx="7009200" cy="3753210"/>
+          </a:xfrm>
+        </p:spPr>
+      </p:pic>
     </p:spTree>
     <p:extLst>
       <p:ext uri="{BB962C8B-B14F-4D97-AF65-F5344CB8AC3E}">
@@ -32631,49 +33243,40 @@
           <a:p>
             <a:r>
               <a:rPr lang="de-DE" dirty="0"/>
-              <a:t>Schnittstelle GUI &lt;-&gt; Nutzer</a:t>
-            </a:r>
-          </a:p>
-        </p:txBody>
-      </p:sp>
-      <p:sp>
-        <p:nvSpPr>
-          <p:cNvPr id="7" name="Inhaltsplatzhalter 6"/>
-          <p:cNvSpPr>
-            <a:spLocks noGrp="1"/>
-          </p:cNvSpPr>
-          <p:nvPr>
-            <p:ph sz="half" idx="1"/>
-          </p:nvPr>
-        </p:nvSpPr>
-        <p:spPr/>
-        <p:txBody>
-          <a:bodyPr/>
-          <a:lstStyle/>
-          <a:p>
-            <a:endParaRPr lang="de-DE"/>
-          </a:p>
-        </p:txBody>
-      </p:sp>
-      <p:sp>
-        <p:nvSpPr>
-          <p:cNvPr id="8" name="Inhaltsplatzhalter 7"/>
-          <p:cNvSpPr>
-            <a:spLocks noGrp="1"/>
-          </p:cNvSpPr>
-          <p:nvPr>
-            <p:ph sz="half" idx="2"/>
-          </p:nvPr>
-        </p:nvSpPr>
-        <p:spPr/>
-        <p:txBody>
-          <a:bodyPr/>
-          <a:lstStyle/>
-          <a:p>
-            <a:endParaRPr lang="de-DE"/>
-          </a:p>
-        </p:txBody>
-      </p:sp>
+              <a:t>Übersicht Anwendungsfälle</a:t>
+            </a:r>
+          </a:p>
+        </p:txBody>
+      </p:sp>
+      <p:pic>
+        <p:nvPicPr>
+          <p:cNvPr id="10" name="Inhaltsplatzhalter 9"/>
+          <p:cNvPicPr>
+            <a:picLocks noGrp="1" noChangeAspect="1"/>
+          </p:cNvPicPr>
+          <p:nvPr>
+            <p:ph idx="1"/>
+          </p:nvPr>
+        </p:nvPicPr>
+        <p:blipFill>
+          <a:blip r:embed="rId3">
+            <a:extLst>
+              <a:ext uri="{28A0092B-C50C-407E-A947-70E740481C1C}">
+                <a14:useLocalDpi xmlns:a14="http://schemas.microsoft.com/office/drawing/2010/main" val="0"/>
+              </a:ext>
+            </a:extLst>
+          </a:blip>
+          <a:stretch>
+            <a:fillRect/>
+          </a:stretch>
+        </p:blipFill>
+        <p:spPr>
+          <a:xfrm>
+            <a:off x="2614930" y="1825625"/>
+            <a:ext cx="6962140" cy="4351338"/>
+          </a:xfrm>
+        </p:spPr>
+      </p:pic>
       <p:sp>
         <p:nvSpPr>
           <p:cNvPr id="4" name="Datumsplatzhalter 3"/>
@@ -32773,7 +33376,7 @@
       </p:grpSpPr>
       <p:sp>
         <p:nvSpPr>
-          <p:cNvPr id="2" name="Titel 1"/>
+          <p:cNvPr id="20" name="Titel 19"/>
           <p:cNvSpPr>
             <a:spLocks noGrp="1"/>
           </p:cNvSpPr>
@@ -32788,24 +33391,19 @@
           <a:p>
             <a:r>
               <a:rPr lang="de-DE" dirty="0"/>
-              <a:t>Schnittstelle GUI &lt;-&gt; Speech </a:t>
-            </a:r>
-            <a:r>
-              <a:rPr lang="de-DE" dirty="0" err="1"/>
-              <a:t>Tokenization</a:t>
-            </a:r>
-            <a:endParaRPr lang="de-DE" dirty="0"/>
-          </a:p>
-        </p:txBody>
-      </p:sp>
-      <p:sp>
-        <p:nvSpPr>
-          <p:cNvPr id="7" name="Inhaltsplatzhalter 6"/>
-          <p:cNvSpPr>
-            <a:spLocks noGrp="1"/>
-          </p:cNvSpPr>
-          <p:nvPr>
-            <p:ph sz="half" idx="1"/>
+              <a:t>Anwendungsfall 1</a:t>
+            </a:r>
+          </a:p>
+        </p:txBody>
+      </p:sp>
+      <p:sp>
+        <p:nvSpPr>
+          <p:cNvPr id="4" name="Datumsplatzhalter 3"/>
+          <p:cNvSpPr>
+            <a:spLocks noGrp="1"/>
+          </p:cNvSpPr>
+          <p:nvPr>
+            <p:ph type="dt" sz="half" idx="10"/>
           </p:nvPr>
         </p:nvSpPr>
         <p:spPr/>
@@ -32813,18 +33411,21 @@
           <a:bodyPr/>
           <a:lstStyle/>
           <a:p>
-            <a:endParaRPr lang="de-DE"/>
-          </a:p>
-        </p:txBody>
-      </p:sp>
-      <p:sp>
-        <p:nvSpPr>
-          <p:cNvPr id="8" name="Inhaltsplatzhalter 7"/>
-          <p:cNvSpPr>
-            <a:spLocks noGrp="1"/>
-          </p:cNvSpPr>
-          <p:nvPr>
-            <p:ph sz="half" idx="2"/>
+            <a:r>
+              <a:rPr lang="de-DE"/>
+              <a:t>04.04.2017</a:t>
+            </a:r>
+          </a:p>
+        </p:txBody>
+      </p:sp>
+      <p:sp>
+        <p:nvSpPr>
+          <p:cNvPr id="5" name="Fußzeilenplatzhalter 4"/>
+          <p:cNvSpPr>
+            <a:spLocks noGrp="1"/>
+          </p:cNvSpPr>
+          <p:nvPr>
+            <p:ph type="ftr" sz="quarter" idx="11"/>
           </p:nvPr>
         </p:nvSpPr>
         <p:spPr/>
@@ -32832,18 +33433,21 @@
           <a:bodyPr/>
           <a:lstStyle/>
           <a:p>
-            <a:endParaRPr lang="de-DE"/>
-          </a:p>
-        </p:txBody>
-      </p:sp>
-      <p:sp>
-        <p:nvSpPr>
-          <p:cNvPr id="4" name="Datumsplatzhalter 3"/>
-          <p:cNvSpPr>
-            <a:spLocks noGrp="1"/>
-          </p:cNvSpPr>
-          <p:nvPr>
-            <p:ph type="dt" sz="half" idx="10"/>
+            <a:r>
+              <a:rPr lang="de-DE"/>
+              <a:t>Florian Blessing, Lisa Böhler, Markus Götz, Jan Habersetzer, Wendelin Herrmann</a:t>
+            </a:r>
+          </a:p>
+        </p:txBody>
+      </p:sp>
+      <p:sp>
+        <p:nvSpPr>
+          <p:cNvPr id="6" name="Foliennummernplatzhalter 5"/>
+          <p:cNvSpPr>
+            <a:spLocks noGrp="1"/>
+          </p:cNvSpPr>
+          <p:nvPr>
+            <p:ph type="sldNum" sz="quarter" idx="12"/>
           </p:nvPr>
         </p:nvSpPr>
         <p:spPr/>
@@ -32851,62 +33455,314 @@
           <a:bodyPr/>
           <a:lstStyle/>
           <a:p>
-            <a:r>
-              <a:rPr lang="de-DE"/>
-              <a:t>04.04.2017</a:t>
-            </a:r>
-          </a:p>
-        </p:txBody>
-      </p:sp>
-      <p:sp>
-        <p:nvSpPr>
-          <p:cNvPr id="5" name="Fußzeilenplatzhalter 4"/>
-          <p:cNvSpPr>
-            <a:spLocks noGrp="1"/>
-          </p:cNvSpPr>
-          <p:nvPr>
-            <p:ph type="ftr" sz="quarter" idx="11"/>
-          </p:nvPr>
-        </p:nvSpPr>
-        <p:spPr/>
-        <p:txBody>
-          <a:bodyPr/>
-          <a:lstStyle/>
-          <a:p>
-            <a:r>
-              <a:rPr lang="de-DE"/>
-              <a:t>Florian Blessing, Lisa Böhler, Markus Götz, Jan Habersetzer, Wendelin Herrmann</a:t>
-            </a:r>
-          </a:p>
-        </p:txBody>
-      </p:sp>
-      <p:sp>
-        <p:nvSpPr>
-          <p:cNvPr id="6" name="Foliennummernplatzhalter 5"/>
-          <p:cNvSpPr>
-            <a:spLocks noGrp="1"/>
-          </p:cNvSpPr>
-          <p:nvPr>
-            <p:ph type="sldNum" sz="quarter" idx="12"/>
-          </p:nvPr>
-        </p:nvSpPr>
-        <p:spPr/>
-        <p:txBody>
-          <a:bodyPr/>
-          <a:lstStyle/>
-          <a:p>
             <a:fld id="{9A8D1588-5235-4A3E-9519-E5C37E4E16B7}" type="slidenum">
               <a:rPr lang="de-DE" smtClean="0"/>
+              <a:pPr/>
               <a:t>13</a:t>
             </a:fld>
             <a:endParaRPr lang="de-DE"/>
           </a:p>
         </p:txBody>
       </p:sp>
+      <p:pic>
+        <p:nvPicPr>
+          <p:cNvPr id="25" name="Inhaltsplatzhalter 24"/>
+          <p:cNvPicPr>
+            <a:picLocks noGrp="1" noChangeAspect="1"/>
+          </p:cNvPicPr>
+          <p:nvPr>
+            <p:ph sz="half" idx="2"/>
+          </p:nvPr>
+        </p:nvPicPr>
+        <p:blipFill>
+          <a:blip r:embed="rId3">
+            <a:extLst>
+              <a:ext uri="{28A0092B-C50C-407E-A947-70E740481C1C}">
+                <a14:useLocalDpi xmlns:a14="http://schemas.microsoft.com/office/drawing/2010/main" val="0"/>
+              </a:ext>
+            </a:extLst>
+          </a:blip>
+          <a:stretch>
+            <a:fillRect/>
+          </a:stretch>
+        </p:blipFill>
+        <p:spPr>
+          <a:xfrm>
+            <a:off x="6172200" y="1825625"/>
+            <a:ext cx="5181600" cy="3238500"/>
+          </a:xfrm>
+        </p:spPr>
+      </p:pic>
+      <p:graphicFrame>
+        <p:nvGraphicFramePr>
+          <p:cNvPr id="23" name="Inhaltsplatzhalter 13"/>
+          <p:cNvGraphicFramePr>
+            <a:graphicFrameLocks noGrp="1"/>
+          </p:cNvGraphicFramePr>
+          <p:nvPr>
+            <p:ph sz="half" idx="1"/>
+            <p:extLst>
+              <p:ext uri="{D42A27DB-BD31-4B8C-83A1-F6EECF244321}">
+                <p14:modId xmlns:p14="http://schemas.microsoft.com/office/powerpoint/2010/main" val="3738710166"/>
+              </p:ext>
+            </p:extLst>
+          </p:nvPr>
+        </p:nvGraphicFramePr>
+        <p:xfrm>
+          <a:off x="838200" y="1825625"/>
+          <a:ext cx="5181600" cy="2123440"/>
+        </p:xfrm>
+        <a:graphic>
+          <a:graphicData uri="http://schemas.openxmlformats.org/drawingml/2006/table">
+            <a:tbl>
+              <a:tblPr firstRow="1" bandRow="1">
+                <a:tableStyleId>{073A0DAA-6AF3-43AB-8588-CEC1D06C72B9}</a:tableStyleId>
+              </a:tblPr>
+              <a:tblGrid>
+                <a:gridCol w="2590800">
+                  <a:extLst>
+                    <a:ext uri="{9D8B030D-6E8A-4147-A177-3AD203B41FA5}">
+                      <a16:colId xmlns:a16="http://schemas.microsoft.com/office/drawing/2014/main" val="13922288"/>
+                    </a:ext>
+                  </a:extLst>
+                </a:gridCol>
+                <a:gridCol w="2590800">
+                  <a:extLst>
+                    <a:ext uri="{9D8B030D-6E8A-4147-A177-3AD203B41FA5}">
+                      <a16:colId xmlns:a16="http://schemas.microsoft.com/office/drawing/2014/main" val="1529278262"/>
+                    </a:ext>
+                  </a:extLst>
+                </a:gridCol>
+              </a:tblGrid>
+              <a:tr h="370840">
+                <a:tc gridSpan="2">
+                  <a:txBody>
+                    <a:bodyPr/>
+                    <a:lstStyle/>
+                    <a:p>
+                      <a:r>
+                        <a:rPr lang="de-DE" dirty="0"/>
+                        <a:t>Schnittstellenspezifikation</a:t>
+                      </a:r>
+                    </a:p>
+                  </a:txBody>
+                  <a:tcPr>
+                    <a:solidFill>
+                      <a:srgbClr val="971917"/>
+                    </a:solidFill>
+                  </a:tcPr>
+                </a:tc>
+                <a:tc hMerge="1">
+                  <a:txBody>
+                    <a:bodyPr/>
+                    <a:lstStyle/>
+                    <a:p>
+                      <a:endParaRPr lang="de-DE" dirty="0"/>
+                    </a:p>
+                  </a:txBody>
+                  <a:tcPr>
+                    <a:solidFill>
+                      <a:srgbClr val="971917"/>
+                    </a:solidFill>
+                  </a:tcPr>
+                </a:tc>
+                <a:extLst>
+                  <a:ext uri="{0D108BD9-81ED-4DB2-BD59-A6C34878D82A}">
+                    <a16:rowId xmlns:a16="http://schemas.microsoft.com/office/drawing/2014/main" val="3922804891"/>
+                  </a:ext>
+                </a:extLst>
+              </a:tr>
+              <a:tr h="370840">
+                <a:tc>
+                  <a:txBody>
+                    <a:bodyPr/>
+                    <a:lstStyle/>
+                    <a:p>
+                      <a:r>
+                        <a:rPr lang="de-DE" b="1" dirty="0"/>
+                        <a:t>Datentyp</a:t>
+                      </a:r>
+                    </a:p>
+                  </a:txBody>
+                  <a:tcPr/>
+                </a:tc>
+                <a:tc>
+                  <a:txBody>
+                    <a:bodyPr/>
+                    <a:lstStyle/>
+                    <a:p>
+                      <a:r>
+                        <a:rPr lang="de-DE" dirty="0"/>
+                        <a:t>HTML</a:t>
+                      </a:r>
+                    </a:p>
+                  </a:txBody>
+                  <a:tcPr/>
+                </a:tc>
+                <a:extLst>
+                  <a:ext uri="{0D108BD9-81ED-4DB2-BD59-A6C34878D82A}">
+                    <a16:rowId xmlns:a16="http://schemas.microsoft.com/office/drawing/2014/main" val="1688323181"/>
+                  </a:ext>
+                </a:extLst>
+              </a:tr>
+              <a:tr h="370840">
+                <a:tc>
+                  <a:txBody>
+                    <a:bodyPr/>
+                    <a:lstStyle/>
+                    <a:p>
+                      <a:r>
+                        <a:rPr lang="de-DE" b="1" dirty="0"/>
+                        <a:t>Protokoll</a:t>
+                      </a:r>
+                    </a:p>
+                  </a:txBody>
+                  <a:tcPr/>
+                </a:tc>
+                <a:tc>
+                  <a:txBody>
+                    <a:bodyPr/>
+                    <a:lstStyle/>
+                    <a:p>
+                      <a:r>
+                        <a:rPr lang="de-DE" dirty="0"/>
+                        <a:t>HTTP</a:t>
+                      </a:r>
+                    </a:p>
+                  </a:txBody>
+                  <a:tcPr/>
+                </a:tc>
+                <a:extLst>
+                  <a:ext uri="{0D108BD9-81ED-4DB2-BD59-A6C34878D82A}">
+                    <a16:rowId xmlns:a16="http://schemas.microsoft.com/office/drawing/2014/main" val="3767124879"/>
+                  </a:ext>
+                </a:extLst>
+              </a:tr>
+              <a:tr h="370840">
+                <a:tc>
+                  <a:txBody>
+                    <a:bodyPr/>
+                    <a:lstStyle/>
+                    <a:p>
+                      <a:r>
+                        <a:rPr lang="de-DE" b="1" dirty="0"/>
+                        <a:t>Art der Schnittstelle</a:t>
+                      </a:r>
+                    </a:p>
+                  </a:txBody>
+                  <a:tcPr/>
+                </a:tc>
+                <a:tc>
+                  <a:txBody>
+                    <a:bodyPr/>
+                    <a:lstStyle/>
+                    <a:p>
+                      <a:r>
+                        <a:rPr lang="de-DE" dirty="0"/>
+                        <a:t>User Interface</a:t>
+                      </a:r>
+                    </a:p>
+                  </a:txBody>
+                  <a:tcPr/>
+                </a:tc>
+                <a:extLst>
+                  <a:ext uri="{0D108BD9-81ED-4DB2-BD59-A6C34878D82A}">
+                    <a16:rowId xmlns:a16="http://schemas.microsoft.com/office/drawing/2014/main" val="2308327065"/>
+                  </a:ext>
+                </a:extLst>
+              </a:tr>
+              <a:tr h="370840">
+                <a:tc>
+                  <a:txBody>
+                    <a:bodyPr/>
+                    <a:lstStyle/>
+                    <a:p>
+                      <a:r>
+                        <a:rPr lang="de-DE" b="1" dirty="0"/>
+                        <a:t>Übergebene</a:t>
+                      </a:r>
+                      <a:r>
+                        <a:rPr lang="de-DE" b="1" baseline="0" dirty="0"/>
+                        <a:t> Informationen</a:t>
+                      </a:r>
+                      <a:endParaRPr lang="de-DE" b="1" dirty="0"/>
+                    </a:p>
+                  </a:txBody>
+                  <a:tcPr/>
+                </a:tc>
+                <a:tc>
+                  <a:txBody>
+                    <a:bodyPr/>
+                    <a:lstStyle/>
+                    <a:p>
+                      <a:r>
+                        <a:rPr lang="de-DE" dirty="0"/>
+                        <a:t>User ID</a:t>
+                      </a:r>
+                    </a:p>
+                  </a:txBody>
+                  <a:tcPr/>
+                </a:tc>
+                <a:extLst>
+                  <a:ext uri="{0D108BD9-81ED-4DB2-BD59-A6C34878D82A}">
+                    <a16:rowId xmlns:a16="http://schemas.microsoft.com/office/drawing/2014/main" val="1885938971"/>
+                  </a:ext>
+                </a:extLst>
+              </a:tr>
+            </a:tbl>
+          </a:graphicData>
+        </a:graphic>
+      </p:graphicFrame>
+      <p:sp>
+        <p:nvSpPr>
+          <p:cNvPr id="26" name="Ellipse 25"/>
+          <p:cNvSpPr/>
+          <p:nvPr/>
+        </p:nvSpPr>
+        <p:spPr>
+          <a:xfrm>
+            <a:off x="6911163" y="3370521"/>
+            <a:ext cx="1573618" cy="563452"/>
+          </a:xfrm>
+          <a:prstGeom prst="ellipse">
+            <a:avLst/>
+          </a:prstGeom>
+          <a:noFill/>
+          <a:ln w="57150">
+            <a:solidFill>
+              <a:srgbClr val="971917"/>
+            </a:solidFill>
+          </a:ln>
+        </p:spPr>
+        <p:style>
+          <a:lnRef idx="2">
+            <a:schemeClr val="accent1">
+              <a:shade val="50000"/>
+            </a:schemeClr>
+          </a:lnRef>
+          <a:fillRef idx="1">
+            <a:schemeClr val="accent1"/>
+          </a:fillRef>
+          <a:effectRef idx="0">
+            <a:schemeClr val="accent1"/>
+          </a:effectRef>
+          <a:fontRef idx="minor">
+            <a:schemeClr val="lt1"/>
+          </a:fontRef>
+        </p:style>
+        <p:txBody>
+          <a:bodyPr rtlCol="0" anchor="ctr"/>
+          <a:lstStyle/>
+          <a:p>
+            <a:pPr algn="ctr"/>
+            <a:endParaRPr lang="de-DE"/>
+          </a:p>
+        </p:txBody>
+      </p:sp>
     </p:spTree>
     <p:extLst>
       <p:ext uri="{BB962C8B-B14F-4D97-AF65-F5344CB8AC3E}">
-        <p14:creationId xmlns:p14="http://schemas.microsoft.com/office/powerpoint/2010/main" val="2656213897"/>
+        <p14:creationId xmlns:p14="http://schemas.microsoft.com/office/powerpoint/2010/main" val="4013378553"/>
       </p:ext>
     </p:extLst>
   </p:cSld>
@@ -32935,36 +33791,12 @@
       </p:grpSpPr>
       <p:sp>
         <p:nvSpPr>
-          <p:cNvPr id="2" name="Titel 1"/>
+          <p:cNvPr id="20" name="Titel 19"/>
           <p:cNvSpPr>
             <a:spLocks noGrp="1"/>
           </p:cNvSpPr>
           <p:nvPr>
             <p:ph type="title"/>
-          </p:nvPr>
-        </p:nvSpPr>
-        <p:spPr/>
-        <p:txBody>
-          <a:bodyPr>
-            <a:normAutofit fontScale="90000"/>
-          </a:bodyPr>
-          <a:lstStyle/>
-          <a:p>
-            <a:r>
-              <a:rPr lang="de-DE" dirty="0"/>
-              <a:t>Schnittstelle GUI &lt;-&gt; Eventbasierte Integration</a:t>
-            </a:r>
-          </a:p>
-        </p:txBody>
-      </p:sp>
-      <p:sp>
-        <p:nvSpPr>
-          <p:cNvPr id="7" name="Inhaltsplatzhalter 6"/>
-          <p:cNvSpPr>
-            <a:spLocks noGrp="1"/>
-          </p:cNvSpPr>
-          <p:nvPr>
-            <p:ph sz="half" idx="1"/>
           </p:nvPr>
         </p:nvSpPr>
         <p:spPr/>
@@ -32972,18 +33804,21 @@
           <a:bodyPr/>
           <a:lstStyle/>
           <a:p>
-            <a:endParaRPr lang="de-DE"/>
-          </a:p>
-        </p:txBody>
-      </p:sp>
-      <p:sp>
-        <p:nvSpPr>
-          <p:cNvPr id="8" name="Inhaltsplatzhalter 7"/>
-          <p:cNvSpPr>
-            <a:spLocks noGrp="1"/>
-          </p:cNvSpPr>
-          <p:nvPr>
-            <p:ph sz="half" idx="2"/>
+            <a:r>
+              <a:rPr lang="de-DE" dirty="0"/>
+              <a:t>Anwendungsfall 2</a:t>
+            </a:r>
+          </a:p>
+        </p:txBody>
+      </p:sp>
+      <p:sp>
+        <p:nvSpPr>
+          <p:cNvPr id="4" name="Datumsplatzhalter 3"/>
+          <p:cNvSpPr>
+            <a:spLocks noGrp="1"/>
+          </p:cNvSpPr>
+          <p:nvPr>
+            <p:ph type="dt" sz="half" idx="10"/>
           </p:nvPr>
         </p:nvSpPr>
         <p:spPr/>
@@ -32991,18 +33826,21 @@
           <a:bodyPr/>
           <a:lstStyle/>
           <a:p>
-            <a:endParaRPr lang="de-DE"/>
-          </a:p>
-        </p:txBody>
-      </p:sp>
-      <p:sp>
-        <p:nvSpPr>
-          <p:cNvPr id="4" name="Datumsplatzhalter 3"/>
-          <p:cNvSpPr>
-            <a:spLocks noGrp="1"/>
-          </p:cNvSpPr>
-          <p:nvPr>
-            <p:ph type="dt" sz="half" idx="10"/>
+            <a:r>
+              <a:rPr lang="de-DE"/>
+              <a:t>04.04.2017</a:t>
+            </a:r>
+          </a:p>
+        </p:txBody>
+      </p:sp>
+      <p:sp>
+        <p:nvSpPr>
+          <p:cNvPr id="5" name="Fußzeilenplatzhalter 4"/>
+          <p:cNvSpPr>
+            <a:spLocks noGrp="1"/>
+          </p:cNvSpPr>
+          <p:nvPr>
+            <p:ph type="ftr" sz="quarter" idx="11"/>
           </p:nvPr>
         </p:nvSpPr>
         <p:spPr/>
@@ -33012,19 +33850,19 @@
           <a:p>
             <a:r>
               <a:rPr lang="de-DE"/>
-              <a:t>04.04.2017</a:t>
-            </a:r>
-          </a:p>
-        </p:txBody>
-      </p:sp>
-      <p:sp>
-        <p:nvSpPr>
-          <p:cNvPr id="5" name="Fußzeilenplatzhalter 4"/>
-          <p:cNvSpPr>
-            <a:spLocks noGrp="1"/>
-          </p:cNvSpPr>
-          <p:nvPr>
-            <p:ph type="ftr" sz="quarter" idx="11"/>
+              <a:t>Florian Blessing, Lisa Böhler, Markus Götz, Jan Habersetzer, Wendelin Herrmann</a:t>
+            </a:r>
+          </a:p>
+        </p:txBody>
+      </p:sp>
+      <p:sp>
+        <p:nvSpPr>
+          <p:cNvPr id="6" name="Foliennummernplatzhalter 5"/>
+          <p:cNvSpPr>
+            <a:spLocks noGrp="1"/>
+          </p:cNvSpPr>
+          <p:nvPr>
+            <p:ph type="sldNum" sz="quarter" idx="12"/>
           </p:nvPr>
         </p:nvSpPr>
         <p:spPr/>
@@ -33032,40 +33870,326 @@
           <a:bodyPr/>
           <a:lstStyle/>
           <a:p>
-            <a:r>
-              <a:rPr lang="de-DE"/>
-              <a:t>Florian Blessing, Lisa Böhler, Markus Götz, Jan Habersetzer, Wendelin Herrmann</a:t>
-            </a:r>
-          </a:p>
-        </p:txBody>
-      </p:sp>
-      <p:sp>
-        <p:nvSpPr>
-          <p:cNvPr id="6" name="Foliennummernplatzhalter 5"/>
-          <p:cNvSpPr>
-            <a:spLocks noGrp="1"/>
-          </p:cNvSpPr>
-          <p:nvPr>
-            <p:ph type="sldNum" sz="quarter" idx="12"/>
-          </p:nvPr>
-        </p:nvSpPr>
-        <p:spPr/>
-        <p:txBody>
-          <a:bodyPr/>
-          <a:lstStyle/>
-          <a:p>
             <a:fld id="{9A8D1588-5235-4A3E-9519-E5C37E4E16B7}" type="slidenum">
               <a:rPr lang="de-DE" smtClean="0"/>
+              <a:pPr/>
               <a:t>14</a:t>
             </a:fld>
             <a:endParaRPr lang="de-DE"/>
           </a:p>
         </p:txBody>
       </p:sp>
+      <p:pic>
+        <p:nvPicPr>
+          <p:cNvPr id="25" name="Inhaltsplatzhalter 24"/>
+          <p:cNvPicPr>
+            <a:picLocks noGrp="1" noChangeAspect="1"/>
+          </p:cNvPicPr>
+          <p:nvPr>
+            <p:ph sz="half" idx="2"/>
+          </p:nvPr>
+        </p:nvPicPr>
+        <p:blipFill>
+          <a:blip r:embed="rId3">
+            <a:extLst>
+              <a:ext uri="{28A0092B-C50C-407E-A947-70E740481C1C}">
+                <a14:useLocalDpi xmlns:a14="http://schemas.microsoft.com/office/drawing/2010/main" val="0"/>
+              </a:ext>
+            </a:extLst>
+          </a:blip>
+          <a:stretch>
+            <a:fillRect/>
+          </a:stretch>
+        </p:blipFill>
+        <p:spPr>
+          <a:xfrm>
+            <a:off x="6172200" y="1825625"/>
+            <a:ext cx="5181600" cy="3238500"/>
+          </a:xfrm>
+        </p:spPr>
+      </p:pic>
+      <p:graphicFrame>
+        <p:nvGraphicFramePr>
+          <p:cNvPr id="23" name="Inhaltsplatzhalter 13"/>
+          <p:cNvGraphicFramePr>
+            <a:graphicFrameLocks noGrp="1"/>
+          </p:cNvGraphicFramePr>
+          <p:nvPr>
+            <p:ph sz="half" idx="1"/>
+            <p:extLst>
+              <p:ext uri="{D42A27DB-BD31-4B8C-83A1-F6EECF244321}">
+                <p14:modId xmlns:p14="http://schemas.microsoft.com/office/powerpoint/2010/main" val="963131485"/>
+              </p:ext>
+            </p:extLst>
+          </p:nvPr>
+        </p:nvGraphicFramePr>
+        <p:xfrm>
+          <a:off x="838200" y="1825625"/>
+          <a:ext cx="5181600" cy="2123440"/>
+        </p:xfrm>
+        <a:graphic>
+          <a:graphicData uri="http://schemas.openxmlformats.org/drawingml/2006/table">
+            <a:tbl>
+              <a:tblPr firstRow="1" bandRow="1">
+                <a:tableStyleId>{073A0DAA-6AF3-43AB-8588-CEC1D06C72B9}</a:tableStyleId>
+              </a:tblPr>
+              <a:tblGrid>
+                <a:gridCol w="2590800">
+                  <a:extLst>
+                    <a:ext uri="{9D8B030D-6E8A-4147-A177-3AD203B41FA5}">
+                      <a16:colId xmlns:a16="http://schemas.microsoft.com/office/drawing/2014/main" val="13922288"/>
+                    </a:ext>
+                  </a:extLst>
+                </a:gridCol>
+                <a:gridCol w="2590800">
+                  <a:extLst>
+                    <a:ext uri="{9D8B030D-6E8A-4147-A177-3AD203B41FA5}">
+                      <a16:colId xmlns:a16="http://schemas.microsoft.com/office/drawing/2014/main" val="1529278262"/>
+                    </a:ext>
+                  </a:extLst>
+                </a:gridCol>
+              </a:tblGrid>
+              <a:tr h="370840">
+                <a:tc gridSpan="2">
+                  <a:txBody>
+                    <a:bodyPr/>
+                    <a:lstStyle/>
+                    <a:p>
+                      <a:r>
+                        <a:rPr lang="de-DE" dirty="0"/>
+                        <a:t>Schnittstellenspezifikation</a:t>
+                      </a:r>
+                    </a:p>
+                  </a:txBody>
+                  <a:tcPr>
+                    <a:solidFill>
+                      <a:srgbClr val="971917"/>
+                    </a:solidFill>
+                  </a:tcPr>
+                </a:tc>
+                <a:tc hMerge="1">
+                  <a:txBody>
+                    <a:bodyPr/>
+                    <a:lstStyle/>
+                    <a:p>
+                      <a:endParaRPr lang="de-DE" dirty="0"/>
+                    </a:p>
+                  </a:txBody>
+                  <a:tcPr>
+                    <a:solidFill>
+                      <a:srgbClr val="971917"/>
+                    </a:solidFill>
+                  </a:tcPr>
+                </a:tc>
+                <a:extLst>
+                  <a:ext uri="{0D108BD9-81ED-4DB2-BD59-A6C34878D82A}">
+                    <a16:rowId xmlns:a16="http://schemas.microsoft.com/office/drawing/2014/main" val="3922804891"/>
+                  </a:ext>
+                </a:extLst>
+              </a:tr>
+              <a:tr h="370840">
+                <a:tc>
+                  <a:txBody>
+                    <a:bodyPr/>
+                    <a:lstStyle/>
+                    <a:p>
+                      <a:r>
+                        <a:rPr lang="de-DE" b="1" dirty="0"/>
+                        <a:t>Datentyp</a:t>
+                      </a:r>
+                    </a:p>
+                  </a:txBody>
+                  <a:tcPr/>
+                </a:tc>
+                <a:tc>
+                  <a:txBody>
+                    <a:bodyPr/>
+                    <a:lstStyle/>
+                    <a:p>
+                      <a:r>
+                        <a:rPr lang="de-DE" dirty="0"/>
+                        <a:t>JSON</a:t>
+                      </a:r>
+                    </a:p>
+                  </a:txBody>
+                  <a:tcPr/>
+                </a:tc>
+                <a:extLst>
+                  <a:ext uri="{0D108BD9-81ED-4DB2-BD59-A6C34878D82A}">
+                    <a16:rowId xmlns:a16="http://schemas.microsoft.com/office/drawing/2014/main" val="1688323181"/>
+                  </a:ext>
+                </a:extLst>
+              </a:tr>
+              <a:tr h="370840">
+                <a:tc>
+                  <a:txBody>
+                    <a:bodyPr/>
+                    <a:lstStyle/>
+                    <a:p>
+                      <a:r>
+                        <a:rPr lang="de-DE" b="1" dirty="0"/>
+                        <a:t>Protokoll</a:t>
+                      </a:r>
+                    </a:p>
+                  </a:txBody>
+                  <a:tcPr/>
+                </a:tc>
+                <a:tc>
+                  <a:txBody>
+                    <a:bodyPr/>
+                    <a:lstStyle/>
+                    <a:p>
+                      <a:r>
+                        <a:rPr lang="de-DE" dirty="0"/>
+                        <a:t>HTTP</a:t>
+                      </a:r>
+                    </a:p>
+                  </a:txBody>
+                  <a:tcPr/>
+                </a:tc>
+                <a:extLst>
+                  <a:ext uri="{0D108BD9-81ED-4DB2-BD59-A6C34878D82A}">
+                    <a16:rowId xmlns:a16="http://schemas.microsoft.com/office/drawing/2014/main" val="3767124879"/>
+                  </a:ext>
+                </a:extLst>
+              </a:tr>
+              <a:tr h="370840">
+                <a:tc>
+                  <a:txBody>
+                    <a:bodyPr/>
+                    <a:lstStyle/>
+                    <a:p>
+                      <a:r>
+                        <a:rPr lang="de-DE" b="1" dirty="0"/>
+                        <a:t>Art der Schnittstelle</a:t>
+                      </a:r>
+                    </a:p>
+                  </a:txBody>
+                  <a:tcPr/>
+                </a:tc>
+                <a:tc>
+                  <a:txBody>
+                    <a:bodyPr/>
+                    <a:lstStyle/>
+                    <a:p>
+                      <a:r>
+                        <a:rPr lang="de-DE" dirty="0"/>
+                        <a:t>REST</a:t>
+                      </a:r>
+                    </a:p>
+                  </a:txBody>
+                  <a:tcPr/>
+                </a:tc>
+                <a:extLst>
+                  <a:ext uri="{0D108BD9-81ED-4DB2-BD59-A6C34878D82A}">
+                    <a16:rowId xmlns:a16="http://schemas.microsoft.com/office/drawing/2014/main" val="2308327065"/>
+                  </a:ext>
+                </a:extLst>
+              </a:tr>
+              <a:tr h="370840">
+                <a:tc>
+                  <a:txBody>
+                    <a:bodyPr/>
+                    <a:lstStyle/>
+                    <a:p>
+                      <a:r>
+                        <a:rPr lang="de-DE" b="1" dirty="0"/>
+                        <a:t>Übergebene</a:t>
+                      </a:r>
+                      <a:r>
+                        <a:rPr lang="de-DE" b="1" baseline="0" dirty="0"/>
+                        <a:t> Informationen</a:t>
+                      </a:r>
+                      <a:endParaRPr lang="de-DE" b="1" dirty="0"/>
+                    </a:p>
+                  </a:txBody>
+                  <a:tcPr/>
+                </a:tc>
+                <a:tc>
+                  <a:txBody>
+                    <a:bodyPr/>
+                    <a:lstStyle/>
+                    <a:p>
+                      <a:r>
+                        <a:rPr lang="de-DE" dirty="0"/>
+                        <a:t>API</a:t>
+                      </a:r>
+                      <a:r>
+                        <a:rPr lang="de-DE" baseline="0" dirty="0"/>
+                        <a:t> Key</a:t>
+                      </a:r>
+                      <a:br>
+                        <a:rPr lang="de-DE" baseline="0" dirty="0"/>
+                      </a:br>
+                      <a:r>
+                        <a:rPr lang="de-DE" baseline="0" dirty="0"/>
+                        <a:t>User ID</a:t>
+                      </a:r>
+                      <a:endParaRPr lang="de-DE" dirty="0"/>
+                    </a:p>
+                  </a:txBody>
+                  <a:tcPr/>
+                </a:tc>
+                <a:extLst>
+                  <a:ext uri="{0D108BD9-81ED-4DB2-BD59-A6C34878D82A}">
+                    <a16:rowId xmlns:a16="http://schemas.microsoft.com/office/drawing/2014/main" val="1885938971"/>
+                  </a:ext>
+                </a:extLst>
+              </a:tr>
+            </a:tbl>
+          </a:graphicData>
+        </a:graphic>
+      </p:graphicFrame>
+      <p:sp>
+        <p:nvSpPr>
+          <p:cNvPr id="8" name="Ellipse 7"/>
+          <p:cNvSpPr/>
+          <p:nvPr/>
+        </p:nvSpPr>
+        <p:spPr>
+          <a:xfrm rot="920198">
+            <a:off x="9197163" y="3534421"/>
+            <a:ext cx="1573618" cy="489098"/>
+          </a:xfrm>
+          <a:prstGeom prst="ellipse">
+            <a:avLst/>
+          </a:prstGeom>
+          <a:noFill/>
+          <a:ln w="57150">
+            <a:solidFill>
+              <a:srgbClr val="971917"/>
+            </a:solidFill>
+          </a:ln>
+        </p:spPr>
+        <p:style>
+          <a:lnRef idx="2">
+            <a:schemeClr val="accent1">
+              <a:shade val="50000"/>
+            </a:schemeClr>
+          </a:lnRef>
+          <a:fillRef idx="1">
+            <a:schemeClr val="accent1"/>
+          </a:fillRef>
+          <a:effectRef idx="0">
+            <a:schemeClr val="accent1"/>
+          </a:effectRef>
+          <a:fontRef idx="minor">
+            <a:schemeClr val="lt1"/>
+          </a:fontRef>
+        </p:style>
+        <p:txBody>
+          <a:bodyPr rtlCol="0" anchor="ctr"/>
+          <a:lstStyle/>
+          <a:p>
+            <a:pPr algn="ctr"/>
+            <a:endParaRPr lang="de-DE"/>
+          </a:p>
+        </p:txBody>
+      </p:sp>
     </p:spTree>
     <p:extLst>
       <p:ext uri="{BB962C8B-B14F-4D97-AF65-F5344CB8AC3E}">
-        <p14:creationId xmlns:p14="http://schemas.microsoft.com/office/powerpoint/2010/main" val="2101431953"/>
+        <p14:creationId xmlns:p14="http://schemas.microsoft.com/office/powerpoint/2010/main" val="4269249613"/>
       </p:ext>
     </p:extLst>
   </p:cSld>
@@ -33076,6 +34200,1727 @@
 </file>
 
 <file path=ppt/slides/slide15.xml><?xml version="1.0" encoding="utf-8"?>
+<p:sld xmlns:a="http://schemas.openxmlformats.org/drawingml/2006/main" xmlns:r="http://schemas.openxmlformats.org/officeDocument/2006/relationships" xmlns:p="http://schemas.openxmlformats.org/presentationml/2006/main">
+  <p:cSld>
+    <p:spTree>
+      <p:nvGrpSpPr>
+        <p:cNvPr id="1" name=""/>
+        <p:cNvGrpSpPr/>
+        <p:nvPr/>
+      </p:nvGrpSpPr>
+      <p:grpSpPr>
+        <a:xfrm>
+          <a:off x="0" y="0"/>
+          <a:ext cx="0" cy="0"/>
+          <a:chOff x="0" y="0"/>
+          <a:chExt cx="0" cy="0"/>
+        </a:xfrm>
+      </p:grpSpPr>
+      <p:sp>
+        <p:nvSpPr>
+          <p:cNvPr id="20" name="Titel 19"/>
+          <p:cNvSpPr>
+            <a:spLocks noGrp="1"/>
+          </p:cNvSpPr>
+          <p:nvPr>
+            <p:ph type="title"/>
+          </p:nvPr>
+        </p:nvSpPr>
+        <p:spPr/>
+        <p:txBody>
+          <a:bodyPr/>
+          <a:lstStyle/>
+          <a:p>
+            <a:r>
+              <a:rPr lang="de-DE" dirty="0"/>
+              <a:t>Anwendungsfall 3</a:t>
+            </a:r>
+          </a:p>
+        </p:txBody>
+      </p:sp>
+      <p:sp>
+        <p:nvSpPr>
+          <p:cNvPr id="4" name="Datumsplatzhalter 3"/>
+          <p:cNvSpPr>
+            <a:spLocks noGrp="1"/>
+          </p:cNvSpPr>
+          <p:nvPr>
+            <p:ph type="dt" sz="half" idx="10"/>
+          </p:nvPr>
+        </p:nvSpPr>
+        <p:spPr/>
+        <p:txBody>
+          <a:bodyPr/>
+          <a:lstStyle/>
+          <a:p>
+            <a:r>
+              <a:rPr lang="de-DE"/>
+              <a:t>04.04.2017</a:t>
+            </a:r>
+          </a:p>
+        </p:txBody>
+      </p:sp>
+      <p:sp>
+        <p:nvSpPr>
+          <p:cNvPr id="5" name="Fußzeilenplatzhalter 4"/>
+          <p:cNvSpPr>
+            <a:spLocks noGrp="1"/>
+          </p:cNvSpPr>
+          <p:nvPr>
+            <p:ph type="ftr" sz="quarter" idx="11"/>
+          </p:nvPr>
+        </p:nvSpPr>
+        <p:spPr/>
+        <p:txBody>
+          <a:bodyPr/>
+          <a:lstStyle/>
+          <a:p>
+            <a:r>
+              <a:rPr lang="de-DE"/>
+              <a:t>Florian Blessing, Lisa Böhler, Markus Götz, Jan Habersetzer, Wendelin Herrmann</a:t>
+            </a:r>
+          </a:p>
+        </p:txBody>
+      </p:sp>
+      <p:sp>
+        <p:nvSpPr>
+          <p:cNvPr id="6" name="Foliennummernplatzhalter 5"/>
+          <p:cNvSpPr>
+            <a:spLocks noGrp="1"/>
+          </p:cNvSpPr>
+          <p:nvPr>
+            <p:ph type="sldNum" sz="quarter" idx="12"/>
+          </p:nvPr>
+        </p:nvSpPr>
+        <p:spPr/>
+        <p:txBody>
+          <a:bodyPr/>
+          <a:lstStyle/>
+          <a:p>
+            <a:fld id="{9A8D1588-5235-4A3E-9519-E5C37E4E16B7}" type="slidenum">
+              <a:rPr lang="de-DE" smtClean="0"/>
+              <a:pPr/>
+              <a:t>15</a:t>
+            </a:fld>
+            <a:endParaRPr lang="de-DE"/>
+          </a:p>
+        </p:txBody>
+      </p:sp>
+      <p:pic>
+        <p:nvPicPr>
+          <p:cNvPr id="25" name="Inhaltsplatzhalter 24"/>
+          <p:cNvPicPr>
+            <a:picLocks noGrp="1" noChangeAspect="1"/>
+          </p:cNvPicPr>
+          <p:nvPr>
+            <p:ph sz="half" idx="2"/>
+          </p:nvPr>
+        </p:nvPicPr>
+        <p:blipFill>
+          <a:blip r:embed="rId3">
+            <a:extLst>
+              <a:ext uri="{28A0092B-C50C-407E-A947-70E740481C1C}">
+                <a14:useLocalDpi xmlns:a14="http://schemas.microsoft.com/office/drawing/2010/main" val="0"/>
+              </a:ext>
+            </a:extLst>
+          </a:blip>
+          <a:stretch>
+            <a:fillRect/>
+          </a:stretch>
+        </p:blipFill>
+        <p:spPr>
+          <a:xfrm>
+            <a:off x="6172200" y="1825625"/>
+            <a:ext cx="5181600" cy="3238500"/>
+          </a:xfrm>
+        </p:spPr>
+      </p:pic>
+      <p:graphicFrame>
+        <p:nvGraphicFramePr>
+          <p:cNvPr id="23" name="Inhaltsplatzhalter 13"/>
+          <p:cNvGraphicFramePr>
+            <a:graphicFrameLocks noGrp="1"/>
+          </p:cNvGraphicFramePr>
+          <p:nvPr>
+            <p:ph sz="half" idx="1"/>
+            <p:extLst>
+              <p:ext uri="{D42A27DB-BD31-4B8C-83A1-F6EECF244321}">
+                <p14:modId xmlns:p14="http://schemas.microsoft.com/office/powerpoint/2010/main" val="2356005722"/>
+              </p:ext>
+            </p:extLst>
+          </p:nvPr>
+        </p:nvGraphicFramePr>
+        <p:xfrm>
+          <a:off x="838200" y="1825625"/>
+          <a:ext cx="5181600" cy="3220720"/>
+        </p:xfrm>
+        <a:graphic>
+          <a:graphicData uri="http://schemas.openxmlformats.org/drawingml/2006/table">
+            <a:tbl>
+              <a:tblPr firstRow="1" bandRow="1">
+                <a:tableStyleId>{073A0DAA-6AF3-43AB-8588-CEC1D06C72B9}</a:tableStyleId>
+              </a:tblPr>
+              <a:tblGrid>
+                <a:gridCol w="2590800">
+                  <a:extLst>
+                    <a:ext uri="{9D8B030D-6E8A-4147-A177-3AD203B41FA5}">
+                      <a16:colId xmlns:a16="http://schemas.microsoft.com/office/drawing/2014/main" val="13922288"/>
+                    </a:ext>
+                  </a:extLst>
+                </a:gridCol>
+                <a:gridCol w="2590800">
+                  <a:extLst>
+                    <a:ext uri="{9D8B030D-6E8A-4147-A177-3AD203B41FA5}">
+                      <a16:colId xmlns:a16="http://schemas.microsoft.com/office/drawing/2014/main" val="1529278262"/>
+                    </a:ext>
+                  </a:extLst>
+                </a:gridCol>
+              </a:tblGrid>
+              <a:tr h="370840">
+                <a:tc gridSpan="2">
+                  <a:txBody>
+                    <a:bodyPr/>
+                    <a:lstStyle/>
+                    <a:p>
+                      <a:r>
+                        <a:rPr lang="de-DE" dirty="0"/>
+                        <a:t>Schnittstellenspezifikation</a:t>
+                      </a:r>
+                    </a:p>
+                  </a:txBody>
+                  <a:tcPr>
+                    <a:solidFill>
+                      <a:srgbClr val="971917"/>
+                    </a:solidFill>
+                  </a:tcPr>
+                </a:tc>
+                <a:tc hMerge="1">
+                  <a:txBody>
+                    <a:bodyPr/>
+                    <a:lstStyle/>
+                    <a:p>
+                      <a:endParaRPr lang="de-DE" dirty="0"/>
+                    </a:p>
+                  </a:txBody>
+                  <a:tcPr>
+                    <a:solidFill>
+                      <a:srgbClr val="971917"/>
+                    </a:solidFill>
+                  </a:tcPr>
+                </a:tc>
+                <a:extLst>
+                  <a:ext uri="{0D108BD9-81ED-4DB2-BD59-A6C34878D82A}">
+                    <a16:rowId xmlns:a16="http://schemas.microsoft.com/office/drawing/2014/main" val="3922804891"/>
+                  </a:ext>
+                </a:extLst>
+              </a:tr>
+              <a:tr h="370840">
+                <a:tc>
+                  <a:txBody>
+                    <a:bodyPr/>
+                    <a:lstStyle/>
+                    <a:p>
+                      <a:r>
+                        <a:rPr lang="de-DE" b="1" dirty="0"/>
+                        <a:t>Datentyp</a:t>
+                      </a:r>
+                    </a:p>
+                  </a:txBody>
+                  <a:tcPr/>
+                </a:tc>
+                <a:tc>
+                  <a:txBody>
+                    <a:bodyPr/>
+                    <a:lstStyle/>
+                    <a:p>
+                      <a:r>
+                        <a:rPr lang="de-DE" dirty="0"/>
+                        <a:t>JSON</a:t>
+                      </a:r>
+                    </a:p>
+                  </a:txBody>
+                  <a:tcPr/>
+                </a:tc>
+                <a:extLst>
+                  <a:ext uri="{0D108BD9-81ED-4DB2-BD59-A6C34878D82A}">
+                    <a16:rowId xmlns:a16="http://schemas.microsoft.com/office/drawing/2014/main" val="1688323181"/>
+                  </a:ext>
+                </a:extLst>
+              </a:tr>
+              <a:tr h="370840">
+                <a:tc>
+                  <a:txBody>
+                    <a:bodyPr/>
+                    <a:lstStyle/>
+                    <a:p>
+                      <a:r>
+                        <a:rPr lang="de-DE" b="1" dirty="0"/>
+                        <a:t>Protokoll</a:t>
+                      </a:r>
+                    </a:p>
+                  </a:txBody>
+                  <a:tcPr/>
+                </a:tc>
+                <a:tc>
+                  <a:txBody>
+                    <a:bodyPr/>
+                    <a:lstStyle/>
+                    <a:p>
+                      <a:r>
+                        <a:rPr lang="de-DE" dirty="0"/>
+                        <a:t>HTTP</a:t>
+                      </a:r>
+                    </a:p>
+                  </a:txBody>
+                  <a:tcPr/>
+                </a:tc>
+                <a:extLst>
+                  <a:ext uri="{0D108BD9-81ED-4DB2-BD59-A6C34878D82A}">
+                    <a16:rowId xmlns:a16="http://schemas.microsoft.com/office/drawing/2014/main" val="3767124879"/>
+                  </a:ext>
+                </a:extLst>
+              </a:tr>
+              <a:tr h="370840">
+                <a:tc>
+                  <a:txBody>
+                    <a:bodyPr/>
+                    <a:lstStyle/>
+                    <a:p>
+                      <a:r>
+                        <a:rPr lang="de-DE" b="1" dirty="0"/>
+                        <a:t>Art der Schnittstelle</a:t>
+                      </a:r>
+                    </a:p>
+                  </a:txBody>
+                  <a:tcPr/>
+                </a:tc>
+                <a:tc>
+                  <a:txBody>
+                    <a:bodyPr/>
+                    <a:lstStyle/>
+                    <a:p>
+                      <a:r>
+                        <a:rPr lang="de-DE" dirty="0"/>
+                        <a:t>REST</a:t>
+                      </a:r>
+                    </a:p>
+                  </a:txBody>
+                  <a:tcPr/>
+                </a:tc>
+                <a:extLst>
+                  <a:ext uri="{0D108BD9-81ED-4DB2-BD59-A6C34878D82A}">
+                    <a16:rowId xmlns:a16="http://schemas.microsoft.com/office/drawing/2014/main" val="2308327065"/>
+                  </a:ext>
+                </a:extLst>
+              </a:tr>
+              <a:tr h="370840">
+                <a:tc>
+                  <a:txBody>
+                    <a:bodyPr/>
+                    <a:lstStyle/>
+                    <a:p>
+                      <a:r>
+                        <a:rPr lang="de-DE" b="1" dirty="0"/>
+                        <a:t>Übergebene</a:t>
+                      </a:r>
+                      <a:r>
+                        <a:rPr lang="de-DE" b="1" baseline="0" dirty="0"/>
+                        <a:t> Informationen</a:t>
+                      </a:r>
+                      <a:endParaRPr lang="de-DE" b="1" dirty="0"/>
+                    </a:p>
+                  </a:txBody>
+                  <a:tcPr/>
+                </a:tc>
+                <a:tc>
+                  <a:txBody>
+                    <a:bodyPr/>
+                    <a:lstStyle/>
+                    <a:p>
+                      <a:r>
+                        <a:rPr lang="de-DE" dirty="0"/>
+                        <a:t>Dokumenten-ID</a:t>
+                      </a:r>
+                      <a:br>
+                        <a:rPr lang="de-DE" dirty="0"/>
+                      </a:br>
+                      <a:r>
+                        <a:rPr lang="de-DE" dirty="0"/>
+                        <a:t>Name</a:t>
+                      </a:r>
+                      <a:br>
+                        <a:rPr lang="de-DE" dirty="0"/>
+                      </a:br>
+                      <a:r>
+                        <a:rPr lang="de-DE" dirty="0"/>
+                        <a:t>Dateityp</a:t>
+                      </a:r>
+                      <a:br>
+                        <a:rPr lang="de-DE" dirty="0"/>
+                      </a:br>
+                      <a:r>
+                        <a:rPr lang="de-DE" dirty="0"/>
+                        <a:t>Datum und Uhrzeit</a:t>
+                      </a:r>
+                      <a:br>
+                        <a:rPr lang="de-DE" dirty="0"/>
+                      </a:br>
+                      <a:r>
+                        <a:rPr lang="de-DE" dirty="0"/>
+                        <a:t>Priorität</a:t>
+                      </a:r>
+                      <a:br>
+                        <a:rPr lang="de-DE" dirty="0"/>
+                      </a:br>
+                      <a:r>
+                        <a:rPr lang="de-DE" dirty="0"/>
+                        <a:t>Link</a:t>
+                      </a:r>
+                    </a:p>
+                  </a:txBody>
+                  <a:tcPr/>
+                </a:tc>
+                <a:extLst>
+                  <a:ext uri="{0D108BD9-81ED-4DB2-BD59-A6C34878D82A}">
+                    <a16:rowId xmlns:a16="http://schemas.microsoft.com/office/drawing/2014/main" val="1885938971"/>
+                  </a:ext>
+                </a:extLst>
+              </a:tr>
+            </a:tbl>
+          </a:graphicData>
+        </a:graphic>
+      </p:graphicFrame>
+      <p:sp>
+        <p:nvSpPr>
+          <p:cNvPr id="8" name="Ellipse 7"/>
+          <p:cNvSpPr/>
+          <p:nvPr/>
+        </p:nvSpPr>
+        <p:spPr>
+          <a:xfrm rot="19814216">
+            <a:off x="8888819" y="2430145"/>
+            <a:ext cx="1573618" cy="489098"/>
+          </a:xfrm>
+          <a:prstGeom prst="ellipse">
+            <a:avLst/>
+          </a:prstGeom>
+          <a:noFill/>
+          <a:ln w="57150">
+            <a:solidFill>
+              <a:srgbClr val="971917"/>
+            </a:solidFill>
+          </a:ln>
+        </p:spPr>
+        <p:style>
+          <a:lnRef idx="2">
+            <a:schemeClr val="accent1">
+              <a:shade val="50000"/>
+            </a:schemeClr>
+          </a:lnRef>
+          <a:fillRef idx="1">
+            <a:schemeClr val="accent1"/>
+          </a:fillRef>
+          <a:effectRef idx="0">
+            <a:schemeClr val="accent1"/>
+          </a:effectRef>
+          <a:fontRef idx="minor">
+            <a:schemeClr val="lt1"/>
+          </a:fontRef>
+        </p:style>
+        <p:txBody>
+          <a:bodyPr rtlCol="0" anchor="ctr"/>
+          <a:lstStyle/>
+          <a:p>
+            <a:pPr algn="ctr"/>
+            <a:endParaRPr lang="de-DE"/>
+          </a:p>
+        </p:txBody>
+      </p:sp>
+    </p:spTree>
+    <p:extLst>
+      <p:ext uri="{BB962C8B-B14F-4D97-AF65-F5344CB8AC3E}">
+        <p14:creationId xmlns:p14="http://schemas.microsoft.com/office/powerpoint/2010/main" val="2429686255"/>
+      </p:ext>
+    </p:extLst>
+  </p:cSld>
+  <p:clrMapOvr>
+    <a:masterClrMapping/>
+  </p:clrMapOvr>
+</p:sld>
+</file>
+
+<file path=ppt/slides/slide16.xml><?xml version="1.0" encoding="utf-8"?>
+<p:sld xmlns:a="http://schemas.openxmlformats.org/drawingml/2006/main" xmlns:r="http://schemas.openxmlformats.org/officeDocument/2006/relationships" xmlns:p="http://schemas.openxmlformats.org/presentationml/2006/main">
+  <p:cSld>
+    <p:spTree>
+      <p:nvGrpSpPr>
+        <p:cNvPr id="1" name=""/>
+        <p:cNvGrpSpPr/>
+        <p:nvPr/>
+      </p:nvGrpSpPr>
+      <p:grpSpPr>
+        <a:xfrm>
+          <a:off x="0" y="0"/>
+          <a:ext cx="0" cy="0"/>
+          <a:chOff x="0" y="0"/>
+          <a:chExt cx="0" cy="0"/>
+        </a:xfrm>
+      </p:grpSpPr>
+      <p:sp>
+        <p:nvSpPr>
+          <p:cNvPr id="20" name="Titel 19"/>
+          <p:cNvSpPr>
+            <a:spLocks noGrp="1"/>
+          </p:cNvSpPr>
+          <p:nvPr>
+            <p:ph type="title"/>
+          </p:nvPr>
+        </p:nvSpPr>
+        <p:spPr/>
+        <p:txBody>
+          <a:bodyPr/>
+          <a:lstStyle/>
+          <a:p>
+            <a:r>
+              <a:rPr lang="de-DE" dirty="0"/>
+              <a:t>Anwendungsfall 4</a:t>
+            </a:r>
+          </a:p>
+        </p:txBody>
+      </p:sp>
+      <p:sp>
+        <p:nvSpPr>
+          <p:cNvPr id="4" name="Datumsplatzhalter 3"/>
+          <p:cNvSpPr>
+            <a:spLocks noGrp="1"/>
+          </p:cNvSpPr>
+          <p:nvPr>
+            <p:ph type="dt" sz="half" idx="10"/>
+          </p:nvPr>
+        </p:nvSpPr>
+        <p:spPr/>
+        <p:txBody>
+          <a:bodyPr/>
+          <a:lstStyle/>
+          <a:p>
+            <a:r>
+              <a:rPr lang="de-DE"/>
+              <a:t>04.04.2017</a:t>
+            </a:r>
+          </a:p>
+        </p:txBody>
+      </p:sp>
+      <p:sp>
+        <p:nvSpPr>
+          <p:cNvPr id="5" name="Fußzeilenplatzhalter 4"/>
+          <p:cNvSpPr>
+            <a:spLocks noGrp="1"/>
+          </p:cNvSpPr>
+          <p:nvPr>
+            <p:ph type="ftr" sz="quarter" idx="11"/>
+          </p:nvPr>
+        </p:nvSpPr>
+        <p:spPr/>
+        <p:txBody>
+          <a:bodyPr/>
+          <a:lstStyle/>
+          <a:p>
+            <a:r>
+              <a:rPr lang="de-DE"/>
+              <a:t>Florian Blessing, Lisa Böhler, Markus Götz, Jan Habersetzer, Wendelin Herrmann</a:t>
+            </a:r>
+          </a:p>
+        </p:txBody>
+      </p:sp>
+      <p:sp>
+        <p:nvSpPr>
+          <p:cNvPr id="6" name="Foliennummernplatzhalter 5"/>
+          <p:cNvSpPr>
+            <a:spLocks noGrp="1"/>
+          </p:cNvSpPr>
+          <p:nvPr>
+            <p:ph type="sldNum" sz="quarter" idx="12"/>
+          </p:nvPr>
+        </p:nvSpPr>
+        <p:spPr/>
+        <p:txBody>
+          <a:bodyPr/>
+          <a:lstStyle/>
+          <a:p>
+            <a:fld id="{9A8D1588-5235-4A3E-9519-E5C37E4E16B7}" type="slidenum">
+              <a:rPr lang="de-DE" smtClean="0"/>
+              <a:pPr/>
+              <a:t>16</a:t>
+            </a:fld>
+            <a:endParaRPr lang="de-DE"/>
+          </a:p>
+        </p:txBody>
+      </p:sp>
+      <p:pic>
+        <p:nvPicPr>
+          <p:cNvPr id="25" name="Inhaltsplatzhalter 24"/>
+          <p:cNvPicPr>
+            <a:picLocks noGrp="1" noChangeAspect="1"/>
+          </p:cNvPicPr>
+          <p:nvPr>
+            <p:ph sz="half" idx="2"/>
+          </p:nvPr>
+        </p:nvPicPr>
+        <p:blipFill>
+          <a:blip r:embed="rId3">
+            <a:extLst>
+              <a:ext uri="{28A0092B-C50C-407E-A947-70E740481C1C}">
+                <a14:useLocalDpi xmlns:a14="http://schemas.microsoft.com/office/drawing/2010/main" val="0"/>
+              </a:ext>
+            </a:extLst>
+          </a:blip>
+          <a:stretch>
+            <a:fillRect/>
+          </a:stretch>
+        </p:blipFill>
+        <p:spPr>
+          <a:xfrm>
+            <a:off x="6172200" y="1825625"/>
+            <a:ext cx="5181600" cy="3238500"/>
+          </a:xfrm>
+        </p:spPr>
+      </p:pic>
+      <p:graphicFrame>
+        <p:nvGraphicFramePr>
+          <p:cNvPr id="23" name="Inhaltsplatzhalter 13"/>
+          <p:cNvGraphicFramePr>
+            <a:graphicFrameLocks noGrp="1"/>
+          </p:cNvGraphicFramePr>
+          <p:nvPr>
+            <p:ph sz="half" idx="1"/>
+            <p:extLst>
+              <p:ext uri="{D42A27DB-BD31-4B8C-83A1-F6EECF244321}">
+                <p14:modId xmlns:p14="http://schemas.microsoft.com/office/powerpoint/2010/main" val="2102027153"/>
+              </p:ext>
+            </p:extLst>
+          </p:nvPr>
+        </p:nvGraphicFramePr>
+        <p:xfrm>
+          <a:off x="838200" y="1825625"/>
+          <a:ext cx="5181600" cy="2672080"/>
+        </p:xfrm>
+        <a:graphic>
+          <a:graphicData uri="http://schemas.openxmlformats.org/drawingml/2006/table">
+            <a:tbl>
+              <a:tblPr firstRow="1" bandRow="1">
+                <a:tableStyleId>{073A0DAA-6AF3-43AB-8588-CEC1D06C72B9}</a:tableStyleId>
+              </a:tblPr>
+              <a:tblGrid>
+                <a:gridCol w="2590800">
+                  <a:extLst>
+                    <a:ext uri="{9D8B030D-6E8A-4147-A177-3AD203B41FA5}">
+                      <a16:colId xmlns:a16="http://schemas.microsoft.com/office/drawing/2014/main" val="13922288"/>
+                    </a:ext>
+                  </a:extLst>
+                </a:gridCol>
+                <a:gridCol w="2590800">
+                  <a:extLst>
+                    <a:ext uri="{9D8B030D-6E8A-4147-A177-3AD203B41FA5}">
+                      <a16:colId xmlns:a16="http://schemas.microsoft.com/office/drawing/2014/main" val="1529278262"/>
+                    </a:ext>
+                  </a:extLst>
+                </a:gridCol>
+              </a:tblGrid>
+              <a:tr h="370840">
+                <a:tc gridSpan="2">
+                  <a:txBody>
+                    <a:bodyPr/>
+                    <a:lstStyle/>
+                    <a:p>
+                      <a:r>
+                        <a:rPr lang="de-DE" dirty="0"/>
+                        <a:t>Schnittstellenspezifikation</a:t>
+                      </a:r>
+                    </a:p>
+                  </a:txBody>
+                  <a:tcPr>
+                    <a:solidFill>
+                      <a:srgbClr val="971917"/>
+                    </a:solidFill>
+                  </a:tcPr>
+                </a:tc>
+                <a:tc hMerge="1">
+                  <a:txBody>
+                    <a:bodyPr/>
+                    <a:lstStyle/>
+                    <a:p>
+                      <a:endParaRPr lang="de-DE" dirty="0"/>
+                    </a:p>
+                  </a:txBody>
+                  <a:tcPr>
+                    <a:solidFill>
+                      <a:srgbClr val="971917"/>
+                    </a:solidFill>
+                  </a:tcPr>
+                </a:tc>
+                <a:extLst>
+                  <a:ext uri="{0D108BD9-81ED-4DB2-BD59-A6C34878D82A}">
+                    <a16:rowId xmlns:a16="http://schemas.microsoft.com/office/drawing/2014/main" val="3922804891"/>
+                  </a:ext>
+                </a:extLst>
+              </a:tr>
+              <a:tr h="370840">
+                <a:tc>
+                  <a:txBody>
+                    <a:bodyPr/>
+                    <a:lstStyle/>
+                    <a:p>
+                      <a:r>
+                        <a:rPr lang="de-DE" b="1" dirty="0"/>
+                        <a:t>Datentyp</a:t>
+                      </a:r>
+                    </a:p>
+                  </a:txBody>
+                  <a:tcPr/>
+                </a:tc>
+                <a:tc>
+                  <a:txBody>
+                    <a:bodyPr/>
+                    <a:lstStyle/>
+                    <a:p>
+                      <a:r>
+                        <a:rPr lang="de-DE" dirty="0"/>
+                        <a:t>HTML</a:t>
+                      </a:r>
+                    </a:p>
+                  </a:txBody>
+                  <a:tcPr/>
+                </a:tc>
+                <a:extLst>
+                  <a:ext uri="{0D108BD9-81ED-4DB2-BD59-A6C34878D82A}">
+                    <a16:rowId xmlns:a16="http://schemas.microsoft.com/office/drawing/2014/main" val="1688323181"/>
+                  </a:ext>
+                </a:extLst>
+              </a:tr>
+              <a:tr h="370840">
+                <a:tc>
+                  <a:txBody>
+                    <a:bodyPr/>
+                    <a:lstStyle/>
+                    <a:p>
+                      <a:r>
+                        <a:rPr lang="de-DE" b="1" dirty="0"/>
+                        <a:t>Protokoll</a:t>
+                      </a:r>
+                    </a:p>
+                  </a:txBody>
+                  <a:tcPr/>
+                </a:tc>
+                <a:tc>
+                  <a:txBody>
+                    <a:bodyPr/>
+                    <a:lstStyle/>
+                    <a:p>
+                      <a:r>
+                        <a:rPr lang="de-DE" dirty="0"/>
+                        <a:t>HTTP</a:t>
+                      </a:r>
+                    </a:p>
+                  </a:txBody>
+                  <a:tcPr/>
+                </a:tc>
+                <a:extLst>
+                  <a:ext uri="{0D108BD9-81ED-4DB2-BD59-A6C34878D82A}">
+                    <a16:rowId xmlns:a16="http://schemas.microsoft.com/office/drawing/2014/main" val="3767124879"/>
+                  </a:ext>
+                </a:extLst>
+              </a:tr>
+              <a:tr h="370840">
+                <a:tc>
+                  <a:txBody>
+                    <a:bodyPr/>
+                    <a:lstStyle/>
+                    <a:p>
+                      <a:r>
+                        <a:rPr lang="de-DE" b="1" dirty="0"/>
+                        <a:t>Art der Schnittstelle</a:t>
+                      </a:r>
+                    </a:p>
+                  </a:txBody>
+                  <a:tcPr/>
+                </a:tc>
+                <a:tc>
+                  <a:txBody>
+                    <a:bodyPr/>
+                    <a:lstStyle/>
+                    <a:p>
+                      <a:r>
+                        <a:rPr lang="de-DE" dirty="0"/>
+                        <a:t>User Interface</a:t>
+                      </a:r>
+                    </a:p>
+                  </a:txBody>
+                  <a:tcPr/>
+                </a:tc>
+                <a:extLst>
+                  <a:ext uri="{0D108BD9-81ED-4DB2-BD59-A6C34878D82A}">
+                    <a16:rowId xmlns:a16="http://schemas.microsoft.com/office/drawing/2014/main" val="2308327065"/>
+                  </a:ext>
+                </a:extLst>
+              </a:tr>
+              <a:tr h="370840">
+                <a:tc>
+                  <a:txBody>
+                    <a:bodyPr/>
+                    <a:lstStyle/>
+                    <a:p>
+                      <a:r>
+                        <a:rPr lang="de-DE" b="1" dirty="0"/>
+                        <a:t>Übergebene</a:t>
+                      </a:r>
+                      <a:r>
+                        <a:rPr lang="de-DE" b="1" baseline="0" dirty="0"/>
+                        <a:t> Informationen</a:t>
+                      </a:r>
+                      <a:endParaRPr lang="de-DE" b="1" dirty="0"/>
+                    </a:p>
+                  </a:txBody>
+                  <a:tcPr/>
+                </a:tc>
+                <a:tc>
+                  <a:txBody>
+                    <a:bodyPr/>
+                    <a:lstStyle/>
+                    <a:p>
+                      <a:r>
+                        <a:rPr lang="de-DE" dirty="0"/>
+                        <a:t>Name</a:t>
+                      </a:r>
+                      <a:br>
+                        <a:rPr lang="de-DE" dirty="0"/>
+                      </a:br>
+                      <a:r>
+                        <a:rPr lang="de-DE" dirty="0"/>
+                        <a:t>Dateityp</a:t>
+                      </a:r>
+                      <a:br>
+                        <a:rPr lang="de-DE" dirty="0"/>
+                      </a:br>
+                      <a:r>
+                        <a:rPr lang="de-DE" dirty="0"/>
+                        <a:t>Priorität</a:t>
+                      </a:r>
+                      <a:br>
+                        <a:rPr lang="de-DE" dirty="0"/>
+                      </a:br>
+                      <a:r>
+                        <a:rPr lang="de-DE" dirty="0"/>
+                        <a:t>Link</a:t>
+                      </a:r>
+                    </a:p>
+                  </a:txBody>
+                  <a:tcPr/>
+                </a:tc>
+                <a:extLst>
+                  <a:ext uri="{0D108BD9-81ED-4DB2-BD59-A6C34878D82A}">
+                    <a16:rowId xmlns:a16="http://schemas.microsoft.com/office/drawing/2014/main" val="1885938971"/>
+                  </a:ext>
+                </a:extLst>
+              </a:tr>
+            </a:tbl>
+          </a:graphicData>
+        </a:graphic>
+      </p:graphicFrame>
+      <p:sp>
+        <p:nvSpPr>
+          <p:cNvPr id="8" name="Ellipse 7"/>
+          <p:cNvSpPr/>
+          <p:nvPr/>
+        </p:nvSpPr>
+        <p:spPr>
+          <a:xfrm>
+            <a:off x="6932429" y="2955777"/>
+            <a:ext cx="1573618" cy="489098"/>
+          </a:xfrm>
+          <a:prstGeom prst="ellipse">
+            <a:avLst/>
+          </a:prstGeom>
+          <a:noFill/>
+          <a:ln w="57150">
+            <a:solidFill>
+              <a:srgbClr val="971917"/>
+            </a:solidFill>
+          </a:ln>
+        </p:spPr>
+        <p:style>
+          <a:lnRef idx="2">
+            <a:schemeClr val="accent1">
+              <a:shade val="50000"/>
+            </a:schemeClr>
+          </a:lnRef>
+          <a:fillRef idx="1">
+            <a:schemeClr val="accent1"/>
+          </a:fillRef>
+          <a:effectRef idx="0">
+            <a:schemeClr val="accent1"/>
+          </a:effectRef>
+          <a:fontRef idx="minor">
+            <a:schemeClr val="lt1"/>
+          </a:fontRef>
+        </p:style>
+        <p:txBody>
+          <a:bodyPr rtlCol="0" anchor="ctr"/>
+          <a:lstStyle/>
+          <a:p>
+            <a:pPr algn="ctr"/>
+            <a:endParaRPr lang="de-DE"/>
+          </a:p>
+        </p:txBody>
+      </p:sp>
+    </p:spTree>
+    <p:extLst>
+      <p:ext uri="{BB962C8B-B14F-4D97-AF65-F5344CB8AC3E}">
+        <p14:creationId xmlns:p14="http://schemas.microsoft.com/office/powerpoint/2010/main" val="1572356197"/>
+      </p:ext>
+    </p:extLst>
+  </p:cSld>
+  <p:clrMapOvr>
+    <a:masterClrMapping/>
+  </p:clrMapOvr>
+</p:sld>
+</file>
+
+<file path=ppt/slides/slide17.xml><?xml version="1.0" encoding="utf-8"?>
+<p:sld xmlns:a="http://schemas.openxmlformats.org/drawingml/2006/main" xmlns:r="http://schemas.openxmlformats.org/officeDocument/2006/relationships" xmlns:p="http://schemas.openxmlformats.org/presentationml/2006/main">
+  <p:cSld>
+    <p:spTree>
+      <p:nvGrpSpPr>
+        <p:cNvPr id="1" name=""/>
+        <p:cNvGrpSpPr/>
+        <p:nvPr/>
+      </p:nvGrpSpPr>
+      <p:grpSpPr>
+        <a:xfrm>
+          <a:off x="0" y="0"/>
+          <a:ext cx="0" cy="0"/>
+          <a:chOff x="0" y="0"/>
+          <a:chExt cx="0" cy="0"/>
+        </a:xfrm>
+      </p:grpSpPr>
+      <p:sp>
+        <p:nvSpPr>
+          <p:cNvPr id="20" name="Titel 19"/>
+          <p:cNvSpPr>
+            <a:spLocks noGrp="1"/>
+          </p:cNvSpPr>
+          <p:nvPr>
+            <p:ph type="title"/>
+          </p:nvPr>
+        </p:nvSpPr>
+        <p:spPr/>
+        <p:txBody>
+          <a:bodyPr/>
+          <a:lstStyle/>
+          <a:p>
+            <a:r>
+              <a:rPr lang="de-DE" dirty="0"/>
+              <a:t>Anwendungsfall 5</a:t>
+            </a:r>
+          </a:p>
+        </p:txBody>
+      </p:sp>
+      <p:sp>
+        <p:nvSpPr>
+          <p:cNvPr id="4" name="Datumsplatzhalter 3"/>
+          <p:cNvSpPr>
+            <a:spLocks noGrp="1"/>
+          </p:cNvSpPr>
+          <p:nvPr>
+            <p:ph type="dt" sz="half" idx="10"/>
+          </p:nvPr>
+        </p:nvSpPr>
+        <p:spPr/>
+        <p:txBody>
+          <a:bodyPr/>
+          <a:lstStyle/>
+          <a:p>
+            <a:r>
+              <a:rPr lang="de-DE"/>
+              <a:t>04.04.2017</a:t>
+            </a:r>
+          </a:p>
+        </p:txBody>
+      </p:sp>
+      <p:sp>
+        <p:nvSpPr>
+          <p:cNvPr id="5" name="Fußzeilenplatzhalter 4"/>
+          <p:cNvSpPr>
+            <a:spLocks noGrp="1"/>
+          </p:cNvSpPr>
+          <p:nvPr>
+            <p:ph type="ftr" sz="quarter" idx="11"/>
+          </p:nvPr>
+        </p:nvSpPr>
+        <p:spPr/>
+        <p:txBody>
+          <a:bodyPr/>
+          <a:lstStyle/>
+          <a:p>
+            <a:r>
+              <a:rPr lang="de-DE"/>
+              <a:t>Florian Blessing, Lisa Böhler, Markus Götz, Jan Habersetzer, Wendelin Herrmann</a:t>
+            </a:r>
+          </a:p>
+        </p:txBody>
+      </p:sp>
+      <p:sp>
+        <p:nvSpPr>
+          <p:cNvPr id="6" name="Foliennummernplatzhalter 5"/>
+          <p:cNvSpPr>
+            <a:spLocks noGrp="1"/>
+          </p:cNvSpPr>
+          <p:nvPr>
+            <p:ph type="sldNum" sz="quarter" idx="12"/>
+          </p:nvPr>
+        </p:nvSpPr>
+        <p:spPr/>
+        <p:txBody>
+          <a:bodyPr/>
+          <a:lstStyle/>
+          <a:p>
+            <a:fld id="{9A8D1588-5235-4A3E-9519-E5C37E4E16B7}" type="slidenum">
+              <a:rPr lang="de-DE" smtClean="0"/>
+              <a:pPr/>
+              <a:t>17</a:t>
+            </a:fld>
+            <a:endParaRPr lang="de-DE"/>
+          </a:p>
+        </p:txBody>
+      </p:sp>
+      <p:pic>
+        <p:nvPicPr>
+          <p:cNvPr id="25" name="Inhaltsplatzhalter 24"/>
+          <p:cNvPicPr>
+            <a:picLocks noGrp="1" noChangeAspect="1"/>
+          </p:cNvPicPr>
+          <p:nvPr>
+            <p:ph sz="half" idx="2"/>
+          </p:nvPr>
+        </p:nvPicPr>
+        <p:blipFill>
+          <a:blip r:embed="rId3">
+            <a:extLst>
+              <a:ext uri="{28A0092B-C50C-407E-A947-70E740481C1C}">
+                <a14:useLocalDpi xmlns:a14="http://schemas.microsoft.com/office/drawing/2010/main" val="0"/>
+              </a:ext>
+            </a:extLst>
+          </a:blip>
+          <a:stretch>
+            <a:fillRect/>
+          </a:stretch>
+        </p:blipFill>
+        <p:spPr>
+          <a:xfrm>
+            <a:off x="6172200" y="1825625"/>
+            <a:ext cx="5181600" cy="3238500"/>
+          </a:xfrm>
+        </p:spPr>
+      </p:pic>
+      <p:graphicFrame>
+        <p:nvGraphicFramePr>
+          <p:cNvPr id="23" name="Inhaltsplatzhalter 13"/>
+          <p:cNvGraphicFramePr>
+            <a:graphicFrameLocks noGrp="1"/>
+          </p:cNvGraphicFramePr>
+          <p:nvPr>
+            <p:ph sz="half" idx="1"/>
+            <p:extLst>
+              <p:ext uri="{D42A27DB-BD31-4B8C-83A1-F6EECF244321}">
+                <p14:modId xmlns:p14="http://schemas.microsoft.com/office/powerpoint/2010/main" val="1692879159"/>
+              </p:ext>
+            </p:extLst>
+          </p:nvPr>
+        </p:nvGraphicFramePr>
+        <p:xfrm>
+          <a:off x="838200" y="1825625"/>
+          <a:ext cx="5181600" cy="2123440"/>
+        </p:xfrm>
+        <a:graphic>
+          <a:graphicData uri="http://schemas.openxmlformats.org/drawingml/2006/table">
+            <a:tbl>
+              <a:tblPr firstRow="1" bandRow="1">
+                <a:tableStyleId>{073A0DAA-6AF3-43AB-8588-CEC1D06C72B9}</a:tableStyleId>
+              </a:tblPr>
+              <a:tblGrid>
+                <a:gridCol w="2590800">
+                  <a:extLst>
+                    <a:ext uri="{9D8B030D-6E8A-4147-A177-3AD203B41FA5}">
+                      <a16:colId xmlns:a16="http://schemas.microsoft.com/office/drawing/2014/main" val="13922288"/>
+                    </a:ext>
+                  </a:extLst>
+                </a:gridCol>
+                <a:gridCol w="2590800">
+                  <a:extLst>
+                    <a:ext uri="{9D8B030D-6E8A-4147-A177-3AD203B41FA5}">
+                      <a16:colId xmlns:a16="http://schemas.microsoft.com/office/drawing/2014/main" val="1529278262"/>
+                    </a:ext>
+                  </a:extLst>
+                </a:gridCol>
+              </a:tblGrid>
+              <a:tr h="370840">
+                <a:tc gridSpan="2">
+                  <a:txBody>
+                    <a:bodyPr/>
+                    <a:lstStyle/>
+                    <a:p>
+                      <a:r>
+                        <a:rPr lang="de-DE" dirty="0"/>
+                        <a:t>Schnittstellenspezifikation</a:t>
+                      </a:r>
+                    </a:p>
+                  </a:txBody>
+                  <a:tcPr>
+                    <a:solidFill>
+                      <a:srgbClr val="971917"/>
+                    </a:solidFill>
+                  </a:tcPr>
+                </a:tc>
+                <a:tc hMerge="1">
+                  <a:txBody>
+                    <a:bodyPr/>
+                    <a:lstStyle/>
+                    <a:p>
+                      <a:endParaRPr lang="de-DE" dirty="0"/>
+                    </a:p>
+                  </a:txBody>
+                  <a:tcPr>
+                    <a:solidFill>
+                      <a:srgbClr val="971917"/>
+                    </a:solidFill>
+                  </a:tcPr>
+                </a:tc>
+                <a:extLst>
+                  <a:ext uri="{0D108BD9-81ED-4DB2-BD59-A6C34878D82A}">
+                    <a16:rowId xmlns:a16="http://schemas.microsoft.com/office/drawing/2014/main" val="3922804891"/>
+                  </a:ext>
+                </a:extLst>
+              </a:tr>
+              <a:tr h="370840">
+                <a:tc>
+                  <a:txBody>
+                    <a:bodyPr/>
+                    <a:lstStyle/>
+                    <a:p>
+                      <a:r>
+                        <a:rPr lang="de-DE" b="1" dirty="0"/>
+                        <a:t>Datentyp</a:t>
+                      </a:r>
+                    </a:p>
+                  </a:txBody>
+                  <a:tcPr/>
+                </a:tc>
+                <a:tc>
+                  <a:txBody>
+                    <a:bodyPr/>
+                    <a:lstStyle/>
+                    <a:p>
+                      <a:r>
+                        <a:rPr lang="de-DE" dirty="0"/>
+                        <a:t>JSON</a:t>
+                      </a:r>
+                    </a:p>
+                  </a:txBody>
+                  <a:tcPr/>
+                </a:tc>
+                <a:extLst>
+                  <a:ext uri="{0D108BD9-81ED-4DB2-BD59-A6C34878D82A}">
+                    <a16:rowId xmlns:a16="http://schemas.microsoft.com/office/drawing/2014/main" val="1688323181"/>
+                  </a:ext>
+                </a:extLst>
+              </a:tr>
+              <a:tr h="370840">
+                <a:tc>
+                  <a:txBody>
+                    <a:bodyPr/>
+                    <a:lstStyle/>
+                    <a:p>
+                      <a:r>
+                        <a:rPr lang="de-DE" b="1" dirty="0"/>
+                        <a:t>Protokoll</a:t>
+                      </a:r>
+                    </a:p>
+                  </a:txBody>
+                  <a:tcPr/>
+                </a:tc>
+                <a:tc>
+                  <a:txBody>
+                    <a:bodyPr/>
+                    <a:lstStyle/>
+                    <a:p>
+                      <a:r>
+                        <a:rPr lang="de-DE" dirty="0"/>
+                        <a:t>HTTP</a:t>
+                      </a:r>
+                    </a:p>
+                  </a:txBody>
+                  <a:tcPr/>
+                </a:tc>
+                <a:extLst>
+                  <a:ext uri="{0D108BD9-81ED-4DB2-BD59-A6C34878D82A}">
+                    <a16:rowId xmlns:a16="http://schemas.microsoft.com/office/drawing/2014/main" val="3767124879"/>
+                  </a:ext>
+                </a:extLst>
+              </a:tr>
+              <a:tr h="370840">
+                <a:tc>
+                  <a:txBody>
+                    <a:bodyPr/>
+                    <a:lstStyle/>
+                    <a:p>
+                      <a:r>
+                        <a:rPr lang="de-DE" b="1" dirty="0"/>
+                        <a:t>Art der Schnittstelle</a:t>
+                      </a:r>
+                    </a:p>
+                  </a:txBody>
+                  <a:tcPr/>
+                </a:tc>
+                <a:tc>
+                  <a:txBody>
+                    <a:bodyPr/>
+                    <a:lstStyle/>
+                    <a:p>
+                      <a:r>
+                        <a:rPr lang="de-DE" dirty="0"/>
+                        <a:t>User Interface</a:t>
+                      </a:r>
+                    </a:p>
+                  </a:txBody>
+                  <a:tcPr/>
+                </a:tc>
+                <a:extLst>
+                  <a:ext uri="{0D108BD9-81ED-4DB2-BD59-A6C34878D82A}">
+                    <a16:rowId xmlns:a16="http://schemas.microsoft.com/office/drawing/2014/main" val="2308327065"/>
+                  </a:ext>
+                </a:extLst>
+              </a:tr>
+              <a:tr h="370840">
+                <a:tc>
+                  <a:txBody>
+                    <a:bodyPr/>
+                    <a:lstStyle/>
+                    <a:p>
+                      <a:r>
+                        <a:rPr lang="de-DE" b="1" dirty="0"/>
+                        <a:t>Übergebene</a:t>
+                      </a:r>
+                      <a:r>
+                        <a:rPr lang="de-DE" b="1" baseline="0" dirty="0"/>
+                        <a:t> Informationen</a:t>
+                      </a:r>
+                      <a:endParaRPr lang="de-DE" b="1" dirty="0"/>
+                    </a:p>
+                  </a:txBody>
+                  <a:tcPr/>
+                </a:tc>
+                <a:tc>
+                  <a:txBody>
+                    <a:bodyPr/>
+                    <a:lstStyle/>
+                    <a:p>
+                      <a:r>
+                        <a:rPr lang="de-DE" dirty="0"/>
+                        <a:t>Dokumenten-ID der ausgewählten</a:t>
+                      </a:r>
+                      <a:r>
+                        <a:rPr lang="de-DE" baseline="0" dirty="0"/>
+                        <a:t> Vorschläge</a:t>
+                      </a:r>
+                      <a:endParaRPr lang="de-DE" dirty="0"/>
+                    </a:p>
+                  </a:txBody>
+                  <a:tcPr/>
+                </a:tc>
+                <a:extLst>
+                  <a:ext uri="{0D108BD9-81ED-4DB2-BD59-A6C34878D82A}">
+                    <a16:rowId xmlns:a16="http://schemas.microsoft.com/office/drawing/2014/main" val="1885938971"/>
+                  </a:ext>
+                </a:extLst>
+              </a:tr>
+            </a:tbl>
+          </a:graphicData>
+        </a:graphic>
+      </p:graphicFrame>
+      <p:sp>
+        <p:nvSpPr>
+          <p:cNvPr id="8" name="Ellipse 7"/>
+          <p:cNvSpPr/>
+          <p:nvPr/>
+        </p:nvSpPr>
+        <p:spPr>
+          <a:xfrm>
+            <a:off x="6921796" y="3413051"/>
+            <a:ext cx="1573618" cy="520922"/>
+          </a:xfrm>
+          <a:prstGeom prst="ellipse">
+            <a:avLst/>
+          </a:prstGeom>
+          <a:noFill/>
+          <a:ln w="57150">
+            <a:solidFill>
+              <a:srgbClr val="971917"/>
+            </a:solidFill>
+          </a:ln>
+        </p:spPr>
+        <p:style>
+          <a:lnRef idx="2">
+            <a:schemeClr val="accent1">
+              <a:shade val="50000"/>
+            </a:schemeClr>
+          </a:lnRef>
+          <a:fillRef idx="1">
+            <a:schemeClr val="accent1"/>
+          </a:fillRef>
+          <a:effectRef idx="0">
+            <a:schemeClr val="accent1"/>
+          </a:effectRef>
+          <a:fontRef idx="minor">
+            <a:schemeClr val="lt1"/>
+          </a:fontRef>
+        </p:style>
+        <p:txBody>
+          <a:bodyPr rtlCol="0" anchor="ctr"/>
+          <a:lstStyle/>
+          <a:p>
+            <a:pPr algn="ctr"/>
+            <a:endParaRPr lang="de-DE"/>
+          </a:p>
+        </p:txBody>
+      </p:sp>
+    </p:spTree>
+    <p:extLst>
+      <p:ext uri="{BB962C8B-B14F-4D97-AF65-F5344CB8AC3E}">
+        <p14:creationId xmlns:p14="http://schemas.microsoft.com/office/powerpoint/2010/main" val="2499483634"/>
+      </p:ext>
+    </p:extLst>
+  </p:cSld>
+  <p:clrMapOvr>
+    <a:masterClrMapping/>
+  </p:clrMapOvr>
+</p:sld>
+</file>
+
+<file path=ppt/slides/slide18.xml><?xml version="1.0" encoding="utf-8"?>
+<p:sld xmlns:a="http://schemas.openxmlformats.org/drawingml/2006/main" xmlns:r="http://schemas.openxmlformats.org/officeDocument/2006/relationships" xmlns:p="http://schemas.openxmlformats.org/presentationml/2006/main">
+  <p:cSld>
+    <p:spTree>
+      <p:nvGrpSpPr>
+        <p:cNvPr id="1" name=""/>
+        <p:cNvGrpSpPr/>
+        <p:nvPr/>
+      </p:nvGrpSpPr>
+      <p:grpSpPr>
+        <a:xfrm>
+          <a:off x="0" y="0"/>
+          <a:ext cx="0" cy="0"/>
+          <a:chOff x="0" y="0"/>
+          <a:chExt cx="0" cy="0"/>
+        </a:xfrm>
+      </p:grpSpPr>
+      <p:sp>
+        <p:nvSpPr>
+          <p:cNvPr id="20" name="Titel 19"/>
+          <p:cNvSpPr>
+            <a:spLocks noGrp="1"/>
+          </p:cNvSpPr>
+          <p:nvPr>
+            <p:ph type="title"/>
+          </p:nvPr>
+        </p:nvSpPr>
+        <p:spPr/>
+        <p:txBody>
+          <a:bodyPr/>
+          <a:lstStyle/>
+          <a:p>
+            <a:r>
+              <a:rPr lang="de-DE" dirty="0"/>
+              <a:t>Anwendungsfall 6</a:t>
+            </a:r>
+          </a:p>
+        </p:txBody>
+      </p:sp>
+      <p:sp>
+        <p:nvSpPr>
+          <p:cNvPr id="4" name="Datumsplatzhalter 3"/>
+          <p:cNvSpPr>
+            <a:spLocks noGrp="1"/>
+          </p:cNvSpPr>
+          <p:nvPr>
+            <p:ph type="dt" sz="half" idx="10"/>
+          </p:nvPr>
+        </p:nvSpPr>
+        <p:spPr/>
+        <p:txBody>
+          <a:bodyPr/>
+          <a:lstStyle/>
+          <a:p>
+            <a:r>
+              <a:rPr lang="de-DE"/>
+              <a:t>04.04.2017</a:t>
+            </a:r>
+          </a:p>
+        </p:txBody>
+      </p:sp>
+      <p:sp>
+        <p:nvSpPr>
+          <p:cNvPr id="5" name="Fußzeilenplatzhalter 4"/>
+          <p:cNvSpPr>
+            <a:spLocks noGrp="1"/>
+          </p:cNvSpPr>
+          <p:nvPr>
+            <p:ph type="ftr" sz="quarter" idx="11"/>
+          </p:nvPr>
+        </p:nvSpPr>
+        <p:spPr/>
+        <p:txBody>
+          <a:bodyPr/>
+          <a:lstStyle/>
+          <a:p>
+            <a:r>
+              <a:rPr lang="de-DE"/>
+              <a:t>Florian Blessing, Lisa Böhler, Markus Götz, Jan Habersetzer, Wendelin Herrmann</a:t>
+            </a:r>
+          </a:p>
+        </p:txBody>
+      </p:sp>
+      <p:sp>
+        <p:nvSpPr>
+          <p:cNvPr id="6" name="Foliennummernplatzhalter 5"/>
+          <p:cNvSpPr>
+            <a:spLocks noGrp="1"/>
+          </p:cNvSpPr>
+          <p:nvPr>
+            <p:ph type="sldNum" sz="quarter" idx="12"/>
+          </p:nvPr>
+        </p:nvSpPr>
+        <p:spPr/>
+        <p:txBody>
+          <a:bodyPr/>
+          <a:lstStyle/>
+          <a:p>
+            <a:fld id="{9A8D1588-5235-4A3E-9519-E5C37E4E16B7}" type="slidenum">
+              <a:rPr lang="de-DE" smtClean="0"/>
+              <a:pPr/>
+              <a:t>18</a:t>
+            </a:fld>
+            <a:endParaRPr lang="de-DE"/>
+          </a:p>
+        </p:txBody>
+      </p:sp>
+      <p:pic>
+        <p:nvPicPr>
+          <p:cNvPr id="25" name="Inhaltsplatzhalter 24"/>
+          <p:cNvPicPr>
+            <a:picLocks noGrp="1" noChangeAspect="1"/>
+          </p:cNvPicPr>
+          <p:nvPr>
+            <p:ph sz="half" idx="2"/>
+          </p:nvPr>
+        </p:nvPicPr>
+        <p:blipFill>
+          <a:blip r:embed="rId3">
+            <a:extLst>
+              <a:ext uri="{28A0092B-C50C-407E-A947-70E740481C1C}">
+                <a14:useLocalDpi xmlns:a14="http://schemas.microsoft.com/office/drawing/2010/main" val="0"/>
+              </a:ext>
+            </a:extLst>
+          </a:blip>
+          <a:stretch>
+            <a:fillRect/>
+          </a:stretch>
+        </p:blipFill>
+        <p:spPr>
+          <a:xfrm>
+            <a:off x="6174000" y="1825625"/>
+            <a:ext cx="5181600" cy="3238500"/>
+          </a:xfrm>
+        </p:spPr>
+      </p:pic>
+      <p:graphicFrame>
+        <p:nvGraphicFramePr>
+          <p:cNvPr id="23" name="Inhaltsplatzhalter 13"/>
+          <p:cNvGraphicFramePr>
+            <a:graphicFrameLocks noGrp="1"/>
+          </p:cNvGraphicFramePr>
+          <p:nvPr>
+            <p:ph sz="half" idx="1"/>
+            <p:extLst>
+              <p:ext uri="{D42A27DB-BD31-4B8C-83A1-F6EECF244321}">
+                <p14:modId xmlns:p14="http://schemas.microsoft.com/office/powerpoint/2010/main" val="3772800912"/>
+              </p:ext>
+            </p:extLst>
+          </p:nvPr>
+        </p:nvGraphicFramePr>
+        <p:xfrm>
+          <a:off x="838200" y="1825625"/>
+          <a:ext cx="5181600" cy="2123440"/>
+        </p:xfrm>
+        <a:graphic>
+          <a:graphicData uri="http://schemas.openxmlformats.org/drawingml/2006/table">
+            <a:tbl>
+              <a:tblPr firstRow="1" bandRow="1">
+                <a:tableStyleId>{073A0DAA-6AF3-43AB-8588-CEC1D06C72B9}</a:tableStyleId>
+              </a:tblPr>
+              <a:tblGrid>
+                <a:gridCol w="2590800">
+                  <a:extLst>
+                    <a:ext uri="{9D8B030D-6E8A-4147-A177-3AD203B41FA5}">
+                      <a16:colId xmlns:a16="http://schemas.microsoft.com/office/drawing/2014/main" val="13922288"/>
+                    </a:ext>
+                  </a:extLst>
+                </a:gridCol>
+                <a:gridCol w="2590800">
+                  <a:extLst>
+                    <a:ext uri="{9D8B030D-6E8A-4147-A177-3AD203B41FA5}">
+                      <a16:colId xmlns:a16="http://schemas.microsoft.com/office/drawing/2014/main" val="1529278262"/>
+                    </a:ext>
+                  </a:extLst>
+                </a:gridCol>
+              </a:tblGrid>
+              <a:tr h="370840">
+                <a:tc gridSpan="2">
+                  <a:txBody>
+                    <a:bodyPr/>
+                    <a:lstStyle/>
+                    <a:p>
+                      <a:r>
+                        <a:rPr lang="de-DE" dirty="0"/>
+                        <a:t>Schnittstellenspezifikation</a:t>
+                      </a:r>
+                    </a:p>
+                  </a:txBody>
+                  <a:tcPr>
+                    <a:solidFill>
+                      <a:srgbClr val="971917"/>
+                    </a:solidFill>
+                  </a:tcPr>
+                </a:tc>
+                <a:tc hMerge="1">
+                  <a:txBody>
+                    <a:bodyPr/>
+                    <a:lstStyle/>
+                    <a:p>
+                      <a:endParaRPr lang="de-DE" dirty="0"/>
+                    </a:p>
+                  </a:txBody>
+                  <a:tcPr>
+                    <a:solidFill>
+                      <a:srgbClr val="971917"/>
+                    </a:solidFill>
+                  </a:tcPr>
+                </a:tc>
+                <a:extLst>
+                  <a:ext uri="{0D108BD9-81ED-4DB2-BD59-A6C34878D82A}">
+                    <a16:rowId xmlns:a16="http://schemas.microsoft.com/office/drawing/2014/main" val="3922804891"/>
+                  </a:ext>
+                </a:extLst>
+              </a:tr>
+              <a:tr h="370840">
+                <a:tc>
+                  <a:txBody>
+                    <a:bodyPr/>
+                    <a:lstStyle/>
+                    <a:p>
+                      <a:r>
+                        <a:rPr lang="de-DE" b="1" dirty="0"/>
+                        <a:t>Datentyp</a:t>
+                      </a:r>
+                    </a:p>
+                  </a:txBody>
+                  <a:tcPr/>
+                </a:tc>
+                <a:tc>
+                  <a:txBody>
+                    <a:bodyPr/>
+                    <a:lstStyle/>
+                    <a:p>
+                      <a:r>
+                        <a:rPr lang="de-DE" dirty="0"/>
+                        <a:t>JSON</a:t>
+                      </a:r>
+                    </a:p>
+                  </a:txBody>
+                  <a:tcPr/>
+                </a:tc>
+                <a:extLst>
+                  <a:ext uri="{0D108BD9-81ED-4DB2-BD59-A6C34878D82A}">
+                    <a16:rowId xmlns:a16="http://schemas.microsoft.com/office/drawing/2014/main" val="1688323181"/>
+                  </a:ext>
+                </a:extLst>
+              </a:tr>
+              <a:tr h="370840">
+                <a:tc>
+                  <a:txBody>
+                    <a:bodyPr/>
+                    <a:lstStyle/>
+                    <a:p>
+                      <a:r>
+                        <a:rPr lang="de-DE" b="1" dirty="0"/>
+                        <a:t>Protokoll</a:t>
+                      </a:r>
+                    </a:p>
+                  </a:txBody>
+                  <a:tcPr/>
+                </a:tc>
+                <a:tc>
+                  <a:txBody>
+                    <a:bodyPr/>
+                    <a:lstStyle/>
+                    <a:p>
+                      <a:r>
+                        <a:rPr lang="de-DE" dirty="0"/>
+                        <a:t>HTTP</a:t>
+                      </a:r>
+                    </a:p>
+                  </a:txBody>
+                  <a:tcPr/>
+                </a:tc>
+                <a:extLst>
+                  <a:ext uri="{0D108BD9-81ED-4DB2-BD59-A6C34878D82A}">
+                    <a16:rowId xmlns:a16="http://schemas.microsoft.com/office/drawing/2014/main" val="3767124879"/>
+                  </a:ext>
+                </a:extLst>
+              </a:tr>
+              <a:tr h="370840">
+                <a:tc>
+                  <a:txBody>
+                    <a:bodyPr/>
+                    <a:lstStyle/>
+                    <a:p>
+                      <a:r>
+                        <a:rPr lang="de-DE" b="1" dirty="0"/>
+                        <a:t>Art der Schnittstelle</a:t>
+                      </a:r>
+                    </a:p>
+                  </a:txBody>
+                  <a:tcPr/>
+                </a:tc>
+                <a:tc>
+                  <a:txBody>
+                    <a:bodyPr/>
+                    <a:lstStyle/>
+                    <a:p>
+                      <a:r>
+                        <a:rPr lang="de-DE" dirty="0"/>
+                        <a:t>REST</a:t>
+                      </a:r>
+                    </a:p>
+                  </a:txBody>
+                  <a:tcPr/>
+                </a:tc>
+                <a:extLst>
+                  <a:ext uri="{0D108BD9-81ED-4DB2-BD59-A6C34878D82A}">
+                    <a16:rowId xmlns:a16="http://schemas.microsoft.com/office/drawing/2014/main" val="2308327065"/>
+                  </a:ext>
+                </a:extLst>
+              </a:tr>
+              <a:tr h="370840">
+                <a:tc>
+                  <a:txBody>
+                    <a:bodyPr/>
+                    <a:lstStyle/>
+                    <a:p>
+                      <a:r>
+                        <a:rPr lang="de-DE" b="1" dirty="0"/>
+                        <a:t>Übergebene</a:t>
+                      </a:r>
+                      <a:r>
+                        <a:rPr lang="de-DE" b="1" baseline="0" dirty="0"/>
+                        <a:t> Informationen</a:t>
+                      </a:r>
+                      <a:endParaRPr lang="de-DE" b="1" dirty="0"/>
+                    </a:p>
+                  </a:txBody>
+                  <a:tcPr/>
+                </a:tc>
+                <a:tc>
+                  <a:txBody>
+                    <a:bodyPr/>
+                    <a:lstStyle/>
+                    <a:p>
+                      <a:r>
+                        <a:rPr lang="de-DE" dirty="0"/>
+                        <a:t>Dokumenten-ID der ausgewählten Vorschläge</a:t>
+                      </a:r>
+                    </a:p>
+                  </a:txBody>
+                  <a:tcPr/>
+                </a:tc>
+                <a:extLst>
+                  <a:ext uri="{0D108BD9-81ED-4DB2-BD59-A6C34878D82A}">
+                    <a16:rowId xmlns:a16="http://schemas.microsoft.com/office/drawing/2014/main" val="1885938971"/>
+                  </a:ext>
+                </a:extLst>
+              </a:tr>
+            </a:tbl>
+          </a:graphicData>
+        </a:graphic>
+      </p:graphicFrame>
+      <p:sp>
+        <p:nvSpPr>
+          <p:cNvPr id="2" name="Ellipse 1"/>
+          <p:cNvSpPr/>
+          <p:nvPr/>
+        </p:nvSpPr>
+        <p:spPr>
+          <a:xfrm rot="19863171">
+            <a:off x="9165539" y="2760902"/>
+            <a:ext cx="1419963" cy="555299"/>
+          </a:xfrm>
+          <a:prstGeom prst="ellipse">
+            <a:avLst/>
+          </a:prstGeom>
+          <a:noFill/>
+          <a:ln w="57150">
+            <a:solidFill>
+              <a:srgbClr val="971917"/>
+            </a:solidFill>
+          </a:ln>
+        </p:spPr>
+        <p:style>
+          <a:lnRef idx="2">
+            <a:schemeClr val="accent1">
+              <a:shade val="50000"/>
+            </a:schemeClr>
+          </a:lnRef>
+          <a:fillRef idx="1">
+            <a:schemeClr val="accent1"/>
+          </a:fillRef>
+          <a:effectRef idx="0">
+            <a:schemeClr val="accent1"/>
+          </a:effectRef>
+          <a:fontRef idx="minor">
+            <a:schemeClr val="lt1"/>
+          </a:fontRef>
+        </p:style>
+        <p:txBody>
+          <a:bodyPr rtlCol="0" anchor="ctr"/>
+          <a:lstStyle/>
+          <a:p>
+            <a:pPr algn="ctr"/>
+            <a:endParaRPr lang="de-DE"/>
+          </a:p>
+        </p:txBody>
+      </p:sp>
+    </p:spTree>
+    <p:extLst>
+      <p:ext uri="{BB962C8B-B14F-4D97-AF65-F5344CB8AC3E}">
+        <p14:creationId xmlns:p14="http://schemas.microsoft.com/office/powerpoint/2010/main" val="35407184"/>
+      </p:ext>
+    </p:extLst>
+  </p:cSld>
+  <p:clrMapOvr>
+    <a:masterClrMapping/>
+  </p:clrMapOvr>
+</p:sld>
+</file>
+
+<file path=ppt/slides/slide19.xml><?xml version="1.0" encoding="utf-8"?>
 <p:sld xmlns:a="http://schemas.openxmlformats.org/drawingml/2006/main" xmlns:r="http://schemas.openxmlformats.org/officeDocument/2006/relationships" xmlns:p="http://schemas.openxmlformats.org/presentationml/2006/main">
   <p:cSld>
     <p:spTree>
@@ -34028,29 +36873,54 @@
           <a:bodyPr/>
           <a:lstStyle/>
           <a:p>
-            <a:endParaRPr lang="de-DE"/>
-          </a:p>
-        </p:txBody>
-      </p:sp>
-      <p:sp>
-        <p:nvSpPr>
-          <p:cNvPr id="8" name="Inhaltsplatzhalter 7"/>
-          <p:cNvSpPr>
-            <a:spLocks noGrp="1"/>
-          </p:cNvSpPr>
+            <a:r>
+              <a:rPr lang="de-DE" dirty="0"/>
+              <a:t>Zugriff auf das System</a:t>
+            </a:r>
+          </a:p>
+          <a:p>
+            <a:r>
+              <a:rPr lang="de-DE" dirty="0"/>
+              <a:t>Identifizierung am System</a:t>
+            </a:r>
+          </a:p>
+          <a:p>
+            <a:r>
+              <a:rPr lang="de-DE" dirty="0"/>
+              <a:t>Darstellung und Auswahlmöglichkeit von Vorschlägen</a:t>
+            </a:r>
+          </a:p>
+        </p:txBody>
+      </p:sp>
+      <p:pic>
+        <p:nvPicPr>
+          <p:cNvPr id="9" name="Inhaltsplatzhalter 8"/>
+          <p:cNvPicPr>
+            <a:picLocks noGrp="1" noChangeAspect="1"/>
+          </p:cNvPicPr>
           <p:nvPr>
             <p:ph sz="half" idx="2"/>
           </p:nvPr>
-        </p:nvSpPr>
-        <p:spPr/>
-        <p:txBody>
-          <a:bodyPr/>
-          <a:lstStyle/>
-          <a:p>
-            <a:endParaRPr lang="de-DE"/>
-          </a:p>
-        </p:txBody>
-      </p:sp>
+        </p:nvPicPr>
+        <p:blipFill>
+          <a:blip r:embed="rId2">
+            <a:extLst>
+              <a:ext uri="{28A0092B-C50C-407E-A947-70E740481C1C}">
+                <a14:useLocalDpi xmlns:a14="http://schemas.microsoft.com/office/drawing/2010/main" val="0"/>
+              </a:ext>
+            </a:extLst>
+          </a:blip>
+          <a:stretch>
+            <a:fillRect/>
+          </a:stretch>
+        </p:blipFill>
+        <p:spPr>
+          <a:xfrm>
+            <a:off x="6400223" y="1825625"/>
+            <a:ext cx="4725553" cy="4351338"/>
+          </a:xfrm>
+        </p:spPr>
+      </p:pic>
       <p:sp>
         <p:nvSpPr>
           <p:cNvPr id="4" name="Datumsplatzhalter 3"/>
@@ -34185,29 +37055,65 @@
           <a:bodyPr/>
           <a:lstStyle/>
           <a:p>
-            <a:endParaRPr lang="de-DE"/>
-          </a:p>
-        </p:txBody>
-      </p:sp>
-      <p:sp>
-        <p:nvSpPr>
-          <p:cNvPr id="8" name="Inhaltsplatzhalter 7"/>
-          <p:cNvSpPr>
-            <a:spLocks noGrp="1"/>
-          </p:cNvSpPr>
+            <a:r>
+              <a:rPr lang="de-DE" dirty="0"/>
+              <a:t>Visuelle Aufbereitung der Vorschläge</a:t>
+            </a:r>
+          </a:p>
+          <a:p>
+            <a:r>
+              <a:rPr lang="de-DE" dirty="0"/>
+              <a:t>Erfassung des Userverhaltens</a:t>
+            </a:r>
+          </a:p>
+          <a:p>
+            <a:r>
+              <a:rPr lang="de-DE" dirty="0"/>
+              <a:t>Erfassung der Userdaten</a:t>
+            </a:r>
+          </a:p>
+          <a:p>
+            <a:r>
+              <a:rPr lang="de-DE" dirty="0"/>
+              <a:t>Initialisierung des Tonabgreifens durch den Speech </a:t>
+            </a:r>
+            <a:r>
+              <a:rPr lang="de-DE" dirty="0" err="1"/>
+              <a:t>Tokenizer</a:t>
+            </a:r>
+            <a:endParaRPr lang="de-DE" dirty="0"/>
+          </a:p>
+        </p:txBody>
+      </p:sp>
+      <p:pic>
+        <p:nvPicPr>
+          <p:cNvPr id="9" name="Inhaltsplatzhalter 8"/>
+          <p:cNvPicPr>
+            <a:picLocks noGrp="1" noChangeAspect="1"/>
+          </p:cNvPicPr>
           <p:nvPr>
             <p:ph sz="half" idx="2"/>
           </p:nvPr>
-        </p:nvSpPr>
-        <p:spPr/>
-        <p:txBody>
-          <a:bodyPr/>
-          <a:lstStyle/>
-          <a:p>
-            <a:endParaRPr lang="de-DE"/>
-          </a:p>
-        </p:txBody>
-      </p:sp>
+        </p:nvPicPr>
+        <p:blipFill>
+          <a:blip r:embed="rId2">
+            <a:extLst>
+              <a:ext uri="{28A0092B-C50C-407E-A947-70E740481C1C}">
+                <a14:useLocalDpi xmlns:a14="http://schemas.microsoft.com/office/drawing/2010/main" val="0"/>
+              </a:ext>
+            </a:extLst>
+          </a:blip>
+          <a:stretch>
+            <a:fillRect/>
+          </a:stretch>
+        </p:blipFill>
+        <p:spPr>
+          <a:xfrm>
+            <a:off x="6252278" y="1825625"/>
+            <a:ext cx="5021444" cy="4351338"/>
+          </a:xfrm>
+        </p:spPr>
+      </p:pic>
       <p:sp>
         <p:nvSpPr>
           <p:cNvPr id="4" name="Datumsplatzhalter 3"/>

</xml_diff>

<commit_message>
Überarbeitung Präsentation Milestone 1
</commit_message>
<xml_diff>
--- a/Non-Code (Doku usw.)/Semester 2/_Präsentationen/Präsentation Milestone 1 04.04.17.pptx
+++ b/Non-Code (Doku usw.)/Semester 2/_Präsentationen/Präsentation Milestone 1 04.04.17.pptx
@@ -32942,7 +32942,7 @@
           <a:p>
             <a:r>
               <a:rPr lang="de-DE" dirty="0"/>
-              <a:t>Aufbau des GUI (1/2)</a:t>
+              <a:t>Komponenten der User Experience (1/2)</a:t>
             </a:r>
           </a:p>
         </p:txBody>
@@ -33095,7 +33095,11 @@
           <a:p>
             <a:r>
               <a:rPr lang="de-DE" dirty="0"/>
-              <a:t>Aufbau des GUI (2/2)</a:t>
+              <a:t>Komponenten der User Experience </a:t>
+            </a:r>
+            <a:r>
+              <a:rPr lang="de-DE" dirty="0"/>
+              <a:t>(2/2)</a:t>
             </a:r>
           </a:p>
         </p:txBody>
@@ -36445,8 +36449,8 @@
         </p:nvSpPr>
         <p:spPr>
           <a:xfrm>
-            <a:off x="4586176" y="2027274"/>
-            <a:ext cx="1928037" cy="886047"/>
+            <a:off x="3476848" y="2027274"/>
+            <a:ext cx="5188688" cy="886047"/>
           </a:xfrm>
           <a:prstGeom prst="rect">
             <a:avLst/>

</xml_diff>